<commit_message>
Added results for mid eval
</commit_message>
<xml_diff>
--- a/documents/Patchmatch_mideval.pptx
+++ b/documents/Patchmatch_mideval.pptx
@@ -12,7 +12,9 @@
     <p:sldId id="260" r:id="rId6"/>
     <p:sldId id="261" r:id="rId7"/>
     <p:sldId id="262" r:id="rId8"/>
-    <p:sldId id="263" r:id="rId9"/>
+    <p:sldId id="264" r:id="rId9"/>
+    <p:sldId id="265" r:id="rId10"/>
+    <p:sldId id="263" r:id="rId11"/>
   </p:sldIdLst>
   <p:sldSz cx="12192000" cy="6858000"/>
   <p:notesSz cx="6858000" cy="9144000"/>
@@ -122,7 +124,7 @@
 <file path=ppt/revisionInfo.xml><?xml version="1.0" encoding="utf-8"?>
 <p1510:revInfo xmlns:a="http://schemas.openxmlformats.org/drawingml/2006/main" xmlns:r="http://schemas.openxmlformats.org/officeDocument/2006/relationships" xmlns:p1510="http://schemas.microsoft.com/office/powerpoint/2015/10/main">
   <p1510:revLst>
-    <p1510:client id="{789503AD-D887-4B7B-84E9-3976BB5B4300}" v="1474" dt="2020-10-29T06:51:38.529"/>
+    <p1510:client id="{789503AD-D887-4B7B-84E9-3976BB5B4300}" v="2003" dt="2020-10-29T13:29:32.008"/>
   </p1510:revLst>
 </p1510:revInfo>
 </file>
@@ -283,7 +285,7 @@
             <a:fld id="{11A6662E-FAF4-44BC-88B5-85A7CBFB6D30}" type="datetime1">
               <a:rPr lang="en-US" smtClean="0"/>
               <a:pPr/>
-              <a:t>10/28/2020</a:t>
+              <a:t>10/29/2020</a:t>
             </a:fld>
             <a:endParaRPr lang="en-US"/>
           </a:p>
@@ -494,7 +496,7 @@
           <a:p>
             <a:fld id="{4C559632-1575-4E14-B53B-3DC3D5ED3947}" type="datetime1">
               <a:rPr lang="en-US" smtClean="0"/>
-              <a:t>10/28/2020</a:t>
+              <a:t>10/29/2020</a:t>
             </a:fld>
             <a:endParaRPr lang="en-US"/>
           </a:p>
@@ -702,7 +704,7 @@
           <a:p>
             <a:fld id="{CC4A6868-2568-4CC9-B302-F37117B01A6E}" type="datetime1">
               <a:rPr lang="en-US" smtClean="0"/>
-              <a:t>10/28/2020</a:t>
+              <a:t>10/29/2020</a:t>
             </a:fld>
             <a:endParaRPr lang="en-US"/>
           </a:p>
@@ -905,7 +907,7 @@
           <a:p>
             <a:fld id="{0055F08A-1E71-4B2B-BB49-E743F2903911}" type="datetime1">
               <a:rPr lang="en-US" smtClean="0"/>
-              <a:t>10/28/2020</a:t>
+              <a:t>10/29/2020</a:t>
             </a:fld>
             <a:endParaRPr lang="en-US" dirty="0"/>
           </a:p>
@@ -1179,7 +1181,7 @@
           <a:p>
             <a:fld id="{15417D9E-721A-44BB-8863-9873FE64DA75}" type="datetime1">
               <a:rPr lang="en-US" smtClean="0"/>
-              <a:t>10/28/2020</a:t>
+              <a:t>10/29/2020</a:t>
             </a:fld>
             <a:endParaRPr lang="en-US"/>
           </a:p>
@@ -1449,7 +1451,7 @@
           <a:p>
             <a:fld id="{5F31DA2F-80B8-49CF-99FB-5ABCA53A607A}" type="datetime1">
               <a:rPr lang="en-US" smtClean="0"/>
-              <a:t>10/28/2020</a:t>
+              <a:t>10/29/2020</a:t>
             </a:fld>
             <a:endParaRPr lang="en-US"/>
           </a:p>
@@ -1862,7 +1864,7 @@
           <a:p>
             <a:fld id="{28852172-E6C9-4B6C-929A-A9DE3837BBF1}" type="datetime1">
               <a:rPr lang="en-US" smtClean="0"/>
-              <a:t>10/28/2020</a:t>
+              <a:t>10/29/2020</a:t>
             </a:fld>
             <a:endParaRPr lang="en-US"/>
           </a:p>
@@ -2008,7 +2010,7 @@
           <a:p>
             <a:fld id="{3AB41CFF-90C9-47B3-9DA1-F2BF8D839F7E}" type="datetime1">
               <a:rPr lang="en-US" smtClean="0"/>
-              <a:t>10/28/2020</a:t>
+              <a:t>10/29/2020</a:t>
             </a:fld>
             <a:endParaRPr lang="en-US"/>
           </a:p>
@@ -2121,7 +2123,7 @@
           <a:p>
             <a:fld id="{F06048FA-06AB-4884-A69B-986B96E68A24}" type="datetime1">
               <a:rPr lang="en-US" smtClean="0"/>
-              <a:t>10/28/2020</a:t>
+              <a:t>10/29/2020</a:t>
             </a:fld>
             <a:endParaRPr lang="en-US"/>
           </a:p>
@@ -2432,7 +2434,7 @@
           <a:p>
             <a:fld id="{50DB7ABA-0172-4F9C-889D-567164F66BCD}" type="datetime1">
               <a:rPr lang="en-US" smtClean="0"/>
-              <a:t>10/28/2020</a:t>
+              <a:t>10/29/2020</a:t>
             </a:fld>
             <a:endParaRPr lang="en-US"/>
           </a:p>
@@ -2723,7 +2725,7 @@
           <a:p>
             <a:fld id="{78AC6A5B-8AE7-4A41-B5A7-9ADC6686DC18}" type="datetime1">
               <a:rPr lang="en-US" smtClean="0"/>
-              <a:t>10/28/2020</a:t>
+              <a:t>10/29/2020</a:t>
             </a:fld>
             <a:endParaRPr lang="en-US"/>
           </a:p>
@@ -3069,7 +3071,7 @@
             <a:fld id="{57E0CF6C-748E-4B7A-BC8B-3011EF78ED13}" type="datetime1">
               <a:rPr lang="en-US" smtClean="0"/>
               <a:pPr/>
-              <a:t>10/28/2020</a:t>
+              <a:t>10/29/2020</a:t>
             </a:fld>
             <a:endParaRPr lang="en-US" dirty="0"/>
           </a:p>
@@ -3888,6 +3890,118 @@
 </p:sld>
 </file>
 
+<file path=ppt/slides/slide10.xml><?xml version="1.0" encoding="utf-8"?>
+<p:sld xmlns:a="http://schemas.openxmlformats.org/drawingml/2006/main" xmlns:r="http://schemas.openxmlformats.org/officeDocument/2006/relationships" xmlns:p="http://schemas.openxmlformats.org/presentationml/2006/main">
+  <p:cSld>
+    <p:spTree>
+      <p:nvGrpSpPr>
+        <p:cNvPr id="1" name=""/>
+        <p:cNvGrpSpPr/>
+        <p:nvPr/>
+      </p:nvGrpSpPr>
+      <p:grpSpPr>
+        <a:xfrm>
+          <a:off x="0" y="0"/>
+          <a:ext cx="0" cy="0"/>
+          <a:chOff x="0" y="0"/>
+          <a:chExt cx="0" cy="0"/>
+        </a:xfrm>
+      </p:grpSpPr>
+      <p:sp>
+        <p:nvSpPr>
+          <p:cNvPr id="2" name="Title 1">
+            <a:extLst>
+              <a:ext uri="{FF2B5EF4-FFF2-40B4-BE49-F238E27FC236}">
+                <a16:creationId xmlns:a16="http://schemas.microsoft.com/office/drawing/2014/main" id="{408EC014-DA8A-4789-9C85-E3750E517F8B}"/>
+              </a:ext>
+            </a:extLst>
+          </p:cNvPr>
+          <p:cNvSpPr>
+            <a:spLocks noGrp="1"/>
+          </p:cNvSpPr>
+          <p:nvPr>
+            <p:ph type="title"/>
+          </p:nvPr>
+        </p:nvSpPr>
+        <p:spPr/>
+        <p:txBody>
+          <a:bodyPr/>
+          <a:lstStyle/>
+          <a:p>
+            <a:r>
+              <a:rPr lang="en-US" dirty="0"/>
+              <a:t>What remains?</a:t>
+            </a:r>
+          </a:p>
+        </p:txBody>
+      </p:sp>
+      <p:sp>
+        <p:nvSpPr>
+          <p:cNvPr id="3" name="Content Placeholder 2">
+            <a:extLst>
+              <a:ext uri="{FF2B5EF4-FFF2-40B4-BE49-F238E27FC236}">
+                <a16:creationId xmlns:a16="http://schemas.microsoft.com/office/drawing/2014/main" id="{7ED3250B-1ECC-4F0F-9FD2-DF2894702547}"/>
+              </a:ext>
+            </a:extLst>
+          </p:cNvPr>
+          <p:cNvSpPr>
+            <a:spLocks noGrp="1"/>
+          </p:cNvSpPr>
+          <p:nvPr>
+            <p:ph idx="1"/>
+          </p:nvPr>
+        </p:nvSpPr>
+        <p:spPr/>
+        <p:txBody>
+          <a:bodyPr vert="horz" lIns="91440" tIns="45720" rIns="91440" bIns="45720" rtlCol="0" anchor="t">
+            <a:normAutofit lnSpcReduction="10000"/>
+          </a:bodyPr>
+          <a:lstStyle/>
+          <a:p>
+            <a:r>
+              <a:rPr lang="en-US" dirty="0"/>
+              <a:t>Further applying the basic patch match algorithm to the datasets given in the proposal – depending on the degree of visual similarity. </a:t>
+            </a:r>
+          </a:p>
+          <a:p>
+            <a:r>
+              <a:rPr lang="en-US" dirty="0"/>
+              <a:t>A GUI needs to be built for the interactive tool, in order to show a visualization and efficacy of the speed enhancements patch match provides.</a:t>
+            </a:r>
+          </a:p>
+          <a:p>
+            <a:r>
+              <a:rPr lang="en-US" dirty="0"/>
+              <a:t>The GUI will have user input capabilities.</a:t>
+            </a:r>
+          </a:p>
+          <a:p>
+            <a:r>
+              <a:rPr lang="en-US" dirty="0"/>
+              <a:t>Applying the patch match algorithm to certain use-cases.</a:t>
+            </a:r>
+          </a:p>
+          <a:p>
+            <a:endParaRPr lang="en-US" dirty="0"/>
+          </a:p>
+          <a:p>
+            <a:endParaRPr lang="en-US" dirty="0"/>
+          </a:p>
+        </p:txBody>
+      </p:sp>
+    </p:spTree>
+    <p:extLst>
+      <p:ext uri="{BB962C8B-B14F-4D97-AF65-F5344CB8AC3E}">
+        <p14:creationId xmlns:p14="http://schemas.microsoft.com/office/powerpoint/2010/main" val="58602504"/>
+      </p:ext>
+    </p:extLst>
+  </p:cSld>
+  <p:clrMapOvr>
+    <a:masterClrMapping/>
+  </p:clrMapOvr>
+</p:sld>
+</file>
+
 <file path=ppt/slides/slide2.xml><?xml version="1.0" encoding="utf-8"?>
 <p:sld xmlns:a="http://schemas.openxmlformats.org/drawingml/2006/main" xmlns:r="http://schemas.openxmlformats.org/officeDocument/2006/relationships" xmlns:p="http://schemas.openxmlformats.org/presentationml/2006/main">
   <p:cSld>
@@ -5572,7 +5686,7 @@
         <p:spPr/>
         <p:txBody>
           <a:bodyPr vert="horz" lIns="91440" tIns="45720" rIns="91440" bIns="45720" rtlCol="0" anchor="t">
-            <a:normAutofit fontScale="92500"/>
+            <a:normAutofit fontScale="92500" lnSpcReduction="20000"/>
           </a:bodyPr>
           <a:lstStyle/>
           <a:p>
@@ -5603,6 +5717,12 @@
             <a:r>
               <a:rPr lang="en-US" dirty="0"/>
               <a:t> described above is complete.</a:t>
+            </a:r>
+          </a:p>
+          <a:p>
+            <a:r>
+              <a:rPr lang="en-US"/>
+              <a:t>Using patch match, reconstruction of one image given another image is complete, as shown in the paper.</a:t>
             </a:r>
           </a:p>
           <a:p>
@@ -5641,6 +5761,14 @@
 <file path=ppt/slides/slide7.xml><?xml version="1.0" encoding="utf-8"?>
 <p:sld xmlns:a="http://schemas.openxmlformats.org/drawingml/2006/main" xmlns:r="http://schemas.openxmlformats.org/officeDocument/2006/relationships" xmlns:p="http://schemas.openxmlformats.org/presentationml/2006/main">
   <p:cSld>
+    <p:bg>
+      <p:bgPr>
+        <a:solidFill>
+          <a:schemeClr val="bg1"/>
+        </a:solidFill>
+        <a:effectLst/>
+      </p:bgPr>
+    </p:bg>
     <p:spTree>
       <p:nvGrpSpPr>
         <p:cNvPr id="1" name=""/>
@@ -5655,6 +5783,307 @@
           <a:chExt cx="0" cy="0"/>
         </a:xfrm>
       </p:grpSpPr>
+      <p:sp useBgFill="1">
+        <p:nvSpPr>
+          <p:cNvPr id="8" name="Rectangle 10">
+            <a:extLst>
+              <a:ext uri="{FF2B5EF4-FFF2-40B4-BE49-F238E27FC236}">
+                <a16:creationId xmlns:a16="http://schemas.microsoft.com/office/drawing/2014/main" id="{4AB8125F-0FD8-48CD-9F43-73E5494EA774}"/>
+              </a:ext>
+              <a:ext uri="{C183D7F6-B498-43B3-948B-1728B52AA6E4}">
+                <adec:decorative xmlns:adec="http://schemas.microsoft.com/office/drawing/2017/decorative" val="1"/>
+              </a:ext>
+            </a:extLst>
+          </p:cNvPr>
+          <p:cNvSpPr>
+            <a:spLocks noGrp="1" noRot="1" noChangeAspect="1" noMove="1" noResize="1" noEditPoints="1" noAdjustHandles="1" noChangeArrowheads="1" noChangeShapeType="1" noTextEdit="1"/>
+          </p:cNvSpPr>
+          <p:nvPr>
+            <p:extLst>
+              <p:ext uri="{386F3935-93C4-4BCD-93E2-E3B085C9AB24}">
+                <p16:designElem xmlns:p16="http://schemas.microsoft.com/office/powerpoint/2015/main" val="1"/>
+              </p:ext>
+            </p:extLst>
+          </p:nvPr>
+        </p:nvSpPr>
+        <p:spPr>
+          <a:xfrm>
+            <a:off x="3048" y="0"/>
+            <a:ext cx="12188952" cy="6858000"/>
+          </a:xfrm>
+          <a:prstGeom prst="rect">
+            <a:avLst/>
+          </a:prstGeom>
+          <a:ln>
+            <a:noFill/>
+          </a:ln>
+        </p:spPr>
+        <p:style>
+          <a:lnRef idx="2">
+            <a:schemeClr val="accent1">
+              <a:shade val="50000"/>
+            </a:schemeClr>
+          </a:lnRef>
+          <a:fillRef idx="1">
+            <a:schemeClr val="accent1"/>
+          </a:fillRef>
+          <a:effectRef idx="0">
+            <a:schemeClr val="accent1"/>
+          </a:effectRef>
+          <a:fontRef idx="minor">
+            <a:schemeClr val="lt1"/>
+          </a:fontRef>
+        </p:style>
+        <p:txBody>
+          <a:bodyPr rtlCol="0" anchor="ctr"/>
+          <a:lstStyle/>
+          <a:p>
+            <a:pPr algn="ctr"/>
+            <a:endParaRPr lang="en-US">
+              <a:solidFill>
+                <a:schemeClr val="tx1">
+                  <a:lumMod val="65000"/>
+                  <a:lumOff val="35000"/>
+                </a:schemeClr>
+              </a:solidFill>
+              <a:latin typeface="AvenirNext LT Pro Medium" panose="020B0504020202020204" pitchFamily="34" charset="0"/>
+            </a:endParaRPr>
+          </a:p>
+        </p:txBody>
+      </p:sp>
+      <p:sp>
+        <p:nvSpPr>
+          <p:cNvPr id="9" name="Rectangle 12">
+            <a:extLst>
+              <a:ext uri="{FF2B5EF4-FFF2-40B4-BE49-F238E27FC236}">
+                <a16:creationId xmlns:a16="http://schemas.microsoft.com/office/drawing/2014/main" id="{0019DD6C-5899-4C07-864B-EB0A7D104ACF}"/>
+              </a:ext>
+              <a:ext uri="{C183D7F6-B498-43B3-948B-1728B52AA6E4}">
+                <adec:decorative xmlns:adec="http://schemas.microsoft.com/office/drawing/2017/decorative" val="1"/>
+              </a:ext>
+            </a:extLst>
+          </p:cNvPr>
+          <p:cNvSpPr>
+            <a:spLocks noGrp="1" noRot="1" noChangeAspect="1" noMove="1" noResize="1" noEditPoints="1" noAdjustHandles="1" noChangeArrowheads="1" noChangeShapeType="1" noTextEdit="1"/>
+          </p:cNvSpPr>
+          <p:nvPr>
+            <p:extLst>
+              <p:ext uri="{386F3935-93C4-4BCD-93E2-E3B085C9AB24}">
+                <p16:designElem xmlns:p16="http://schemas.microsoft.com/office/powerpoint/2015/main" val="1"/>
+              </p:ext>
+            </p:extLst>
+          </p:nvPr>
+        </p:nvSpPr>
+        <p:spPr>
+          <a:xfrm>
+            <a:off x="3048" y="0"/>
+            <a:ext cx="12188952" cy="6858000"/>
+          </a:xfrm>
+          <a:prstGeom prst="rect">
+            <a:avLst/>
+          </a:prstGeom>
+          <a:solidFill>
+            <a:schemeClr val="bg2">
+              <a:alpha val="70000"/>
+            </a:schemeClr>
+          </a:solidFill>
+          <a:ln>
+            <a:noFill/>
+          </a:ln>
+        </p:spPr>
+        <p:style>
+          <a:lnRef idx="2">
+            <a:schemeClr val="accent1">
+              <a:shade val="50000"/>
+            </a:schemeClr>
+          </a:lnRef>
+          <a:fillRef idx="1">
+            <a:schemeClr val="accent1"/>
+          </a:fillRef>
+          <a:effectRef idx="0">
+            <a:schemeClr val="accent1"/>
+          </a:effectRef>
+          <a:fontRef idx="minor">
+            <a:schemeClr val="lt1"/>
+          </a:fontRef>
+        </p:style>
+        <p:txBody>
+          <a:bodyPr rtlCol="0" anchor="ctr"/>
+          <a:lstStyle/>
+          <a:p>
+            <a:pPr algn="ctr"/>
+            <a:endParaRPr lang="en-US">
+              <a:solidFill>
+                <a:schemeClr val="tx1">
+                  <a:lumMod val="65000"/>
+                  <a:lumOff val="35000"/>
+                </a:schemeClr>
+              </a:solidFill>
+              <a:latin typeface="AvenirNext LT Pro Medium" panose="020B0504020202020204" pitchFamily="34" charset="0"/>
+            </a:endParaRPr>
+          </a:p>
+        </p:txBody>
+      </p:sp>
+      <p:sp>
+        <p:nvSpPr>
+          <p:cNvPr id="10" name="Rectangle 14">
+            <a:extLst>
+              <a:ext uri="{FF2B5EF4-FFF2-40B4-BE49-F238E27FC236}">
+                <a16:creationId xmlns:a16="http://schemas.microsoft.com/office/drawing/2014/main" id="{EBDFFBC1-15BD-428E-B8AF-ECF5D1B76DEB}"/>
+              </a:ext>
+              <a:ext uri="{C183D7F6-B498-43B3-948B-1728B52AA6E4}">
+                <adec:decorative xmlns:adec="http://schemas.microsoft.com/office/drawing/2017/decorative" val="1"/>
+              </a:ext>
+            </a:extLst>
+          </p:cNvPr>
+          <p:cNvSpPr>
+            <a:spLocks noGrp="1" noRot="1" noChangeAspect="1" noMove="1" noResize="1" noEditPoints="1" noAdjustHandles="1" noChangeArrowheads="1" noChangeShapeType="1" noTextEdit="1"/>
+          </p:cNvSpPr>
+          <p:nvPr>
+            <p:extLst>
+              <p:ext uri="{386F3935-93C4-4BCD-93E2-E3B085C9AB24}">
+                <p16:designElem xmlns:p16="http://schemas.microsoft.com/office/powerpoint/2015/main" val="1"/>
+              </p:ext>
+            </p:extLst>
+          </p:nvPr>
+        </p:nvSpPr>
+        <p:spPr>
+          <a:xfrm>
+            <a:off x="0" y="3379190"/>
+            <a:ext cx="12192000" cy="3478810"/>
+          </a:xfrm>
+          <a:prstGeom prst="rect">
+            <a:avLst/>
+          </a:prstGeom>
+          <a:solidFill>
+            <a:schemeClr val="tx2">
+              <a:lumMod val="90000"/>
+              <a:lumOff val="10000"/>
+            </a:schemeClr>
+          </a:solidFill>
+          <a:ln>
+            <a:noFill/>
+          </a:ln>
+        </p:spPr>
+        <p:style>
+          <a:lnRef idx="2">
+            <a:schemeClr val="accent1">
+              <a:shade val="50000"/>
+            </a:schemeClr>
+          </a:lnRef>
+          <a:fillRef idx="1">
+            <a:schemeClr val="accent1"/>
+          </a:fillRef>
+          <a:effectRef idx="0">
+            <a:schemeClr val="accent1"/>
+          </a:effectRef>
+          <a:fontRef idx="minor">
+            <a:schemeClr val="lt1"/>
+          </a:fontRef>
+        </p:style>
+        <p:txBody>
+          <a:bodyPr rtlCol="0" anchor="ctr"/>
+          <a:lstStyle/>
+          <a:p>
+            <a:pPr algn="ctr"/>
+            <a:endParaRPr lang="en-US" dirty="0">
+              <a:solidFill>
+                <a:schemeClr val="tx1">
+                  <a:lumMod val="65000"/>
+                  <a:lumOff val="35000"/>
+                </a:schemeClr>
+              </a:solidFill>
+              <a:latin typeface="AvenirNext LT Pro Medium" panose="020B0504020202020204" pitchFamily="34" charset="0"/>
+            </a:endParaRPr>
+          </a:p>
+        </p:txBody>
+      </p:sp>
+      <p:sp>
+        <p:nvSpPr>
+          <p:cNvPr id="12" name="Rectangle 16">
+            <a:extLst>
+              <a:ext uri="{FF2B5EF4-FFF2-40B4-BE49-F238E27FC236}">
+                <a16:creationId xmlns:a16="http://schemas.microsoft.com/office/drawing/2014/main" id="{EBFB3075-0323-4EB0-B1A5-776A0E709CEF}"/>
+              </a:ext>
+              <a:ext uri="{C183D7F6-B498-43B3-948B-1728B52AA6E4}">
+                <adec:decorative xmlns:adec="http://schemas.microsoft.com/office/drawing/2017/decorative" val="1"/>
+              </a:ext>
+            </a:extLst>
+          </p:cNvPr>
+          <p:cNvSpPr>
+            <a:spLocks noGrp="1" noRot="1" noChangeAspect="1" noMove="1" noResize="1" noEditPoints="1" noAdjustHandles="1" noChangeArrowheads="1" noChangeShapeType="1" noTextEdit="1"/>
+          </p:cNvSpPr>
+          <p:nvPr>
+            <p:extLst>
+              <p:ext uri="{386F3935-93C4-4BCD-93E2-E3B085C9AB24}">
+                <p16:designElem xmlns:p16="http://schemas.microsoft.com/office/powerpoint/2015/main" val="1"/>
+              </p:ext>
+            </p:extLst>
+          </p:nvPr>
+        </p:nvSpPr>
+        <p:spPr>
+          <a:xfrm rot="10800000">
+            <a:off x="1" y="3379190"/>
+            <a:ext cx="12191999" cy="3478809"/>
+          </a:xfrm>
+          <a:prstGeom prst="rect">
+            <a:avLst/>
+          </a:prstGeom>
+          <a:blipFill dpi="0" rotWithShape="1">
+            <a:blip r:embed="rId2">
+              <a:alphaModFix amt="20000"/>
+              <a:duotone>
+                <a:schemeClr val="accent1">
+                  <a:shade val="45000"/>
+                  <a:satMod val="135000"/>
+                </a:schemeClr>
+                <a:prstClr val="white"/>
+              </a:duotone>
+            </a:blip>
+            <a:srcRect/>
+            <a:tile tx="889000" ty="0" sx="100000" sy="100000" flip="none" algn="tl"/>
+          </a:blipFill>
+          <a:ln>
+            <a:noFill/>
+          </a:ln>
+        </p:spPr>
+        <p:style>
+          <a:lnRef idx="2">
+            <a:schemeClr val="accent1">
+              <a:shade val="50000"/>
+            </a:schemeClr>
+          </a:lnRef>
+          <a:fillRef idx="1">
+            <a:schemeClr val="accent1"/>
+          </a:fillRef>
+          <a:effectRef idx="0">
+            <a:schemeClr val="accent1"/>
+          </a:effectRef>
+          <a:fontRef idx="minor">
+            <a:schemeClr val="lt1"/>
+          </a:fontRef>
+        </p:style>
+        <p:txBody>
+          <a:bodyPr rtlCol="0" anchor="ctr"/>
+          <a:lstStyle/>
+          <a:p>
+            <a:pPr algn="ctr">
+              <a:spcAft>
+                <a:spcPts val="600"/>
+              </a:spcAft>
+            </a:pPr>
+            <a:endParaRPr lang="en-US" dirty="0"/>
+          </a:p>
+          <a:p>
+            <a:pPr algn="ctr">
+              <a:spcAft>
+                <a:spcPts val="600"/>
+              </a:spcAft>
+            </a:pPr>
+            <a:endParaRPr lang="en-US" dirty="0"/>
+          </a:p>
+        </p:txBody>
+      </p:sp>
       <p:sp>
         <p:nvSpPr>
           <p:cNvPr id="2" name="Title 1">
@@ -5671,18 +6100,115 @@
             <p:ph type="title"/>
           </p:nvPr>
         </p:nvSpPr>
-        <p:spPr/>
-        <p:txBody>
-          <a:bodyPr/>
-          <a:lstStyle/>
-          <a:p>
-            <a:r>
-              <a:rPr lang="en-US" dirty="0"/>
-              <a:t>Intermediate results</a:t>
-            </a:r>
-          </a:p>
-        </p:txBody>
-      </p:sp>
+        <p:spPr>
+          <a:xfrm>
+            <a:off x="838200" y="3801746"/>
+            <a:ext cx="5181600" cy="2446654"/>
+          </a:xfrm>
+        </p:spPr>
+        <p:txBody>
+          <a:bodyPr>
+            <a:normAutofit/>
+          </a:bodyPr>
+          <a:lstStyle/>
+          <a:p>
+            <a:r>
+              <a:rPr lang="en-US"/>
+              <a:t>Results –1 </a:t>
+            </a:r>
+          </a:p>
+        </p:txBody>
+      </p:sp>
+      <p:pic>
+        <p:nvPicPr>
+          <p:cNvPr id="5" name="Picture 5" descr="A close up of a mans face&#10;&#10;Description automatically generated">
+            <a:extLst>
+              <a:ext uri="{FF2B5EF4-FFF2-40B4-BE49-F238E27FC236}">
+                <a16:creationId xmlns:a16="http://schemas.microsoft.com/office/drawing/2014/main" id="{5CDF318E-365D-453C-867C-D5F658E21EAA}"/>
+              </a:ext>
+            </a:extLst>
+          </p:cNvPr>
+          <p:cNvPicPr>
+            <a:picLocks noChangeAspect="1"/>
+          </p:cNvPicPr>
+          <p:nvPr/>
+        </p:nvPicPr>
+        <p:blipFill>
+          <a:blip r:embed="rId3"/>
+          <a:stretch>
+            <a:fillRect/>
+          </a:stretch>
+        </p:blipFill>
+        <p:spPr>
+          <a:xfrm>
+            <a:off x="4598936" y="124964"/>
+            <a:ext cx="2979166" cy="2451844"/>
+          </a:xfrm>
+          <a:prstGeom prst="rect">
+            <a:avLst/>
+          </a:prstGeom>
+        </p:spPr>
+      </p:pic>
+      <p:pic>
+        <p:nvPicPr>
+          <p:cNvPr id="4" name="Picture 4" descr="A person looking at the camera&#10;&#10;Description automatically generated">
+            <a:extLst>
+              <a:ext uri="{FF2B5EF4-FFF2-40B4-BE49-F238E27FC236}">
+                <a16:creationId xmlns:a16="http://schemas.microsoft.com/office/drawing/2014/main" id="{06CAC30C-7527-4EFC-8BA9-BAE6E3B380EF}"/>
+              </a:ext>
+            </a:extLst>
+          </p:cNvPr>
+          <p:cNvPicPr>
+            <a:picLocks noChangeAspect="1"/>
+          </p:cNvPicPr>
+          <p:nvPr/>
+        </p:nvPicPr>
+        <p:blipFill>
+          <a:blip r:embed="rId4"/>
+          <a:stretch>
+            <a:fillRect/>
+          </a:stretch>
+        </p:blipFill>
+        <p:spPr>
+          <a:xfrm>
+            <a:off x="386612" y="448366"/>
+            <a:ext cx="4001976" cy="1696575"/>
+          </a:xfrm>
+          <a:prstGeom prst="rect">
+            <a:avLst/>
+          </a:prstGeom>
+        </p:spPr>
+      </p:pic>
+      <p:pic>
+        <p:nvPicPr>
+          <p:cNvPr id="6" name="Picture 6" descr="A close up of a person&#10;&#10;Description automatically generated">
+            <a:extLst>
+              <a:ext uri="{FF2B5EF4-FFF2-40B4-BE49-F238E27FC236}">
+                <a16:creationId xmlns:a16="http://schemas.microsoft.com/office/drawing/2014/main" id="{04B8FE2B-00D4-47C1-BE0B-D7582AB6099C}"/>
+              </a:ext>
+            </a:extLst>
+          </p:cNvPr>
+          <p:cNvPicPr>
+            <a:picLocks noChangeAspect="1"/>
+          </p:cNvPicPr>
+          <p:nvPr/>
+        </p:nvPicPr>
+        <p:blipFill>
+          <a:blip r:embed="rId5"/>
+          <a:stretch>
+            <a:fillRect/>
+          </a:stretch>
+        </p:blipFill>
+        <p:spPr>
+          <a:xfrm>
+            <a:off x="8272660" y="206556"/>
+            <a:ext cx="3048883" cy="2636872"/>
+          </a:xfrm>
+          <a:prstGeom prst="rect">
+            <a:avLst/>
+          </a:prstGeom>
+        </p:spPr>
+      </p:pic>
       <p:sp>
         <p:nvSpPr>
           <p:cNvPr id="3" name="Content Placeholder 2">
@@ -5699,12 +6225,147 @@
             <p:ph idx="1"/>
           </p:nvPr>
         </p:nvSpPr>
-        <p:spPr/>
-        <p:txBody>
-          <a:bodyPr/>
-          <a:lstStyle/>
-          <a:p>
-            <a:endParaRPr lang="en-US"/>
+        <p:spPr>
+          <a:xfrm>
+            <a:off x="6248400" y="3801746"/>
+            <a:ext cx="5181600" cy="2446654"/>
+          </a:xfrm>
+        </p:spPr>
+        <p:txBody>
+          <a:bodyPr vert="horz" lIns="91440" tIns="45720" rIns="91440" bIns="45720" rtlCol="0" anchor="ctr">
+            <a:normAutofit/>
+          </a:bodyPr>
+          <a:lstStyle/>
+          <a:p>
+            <a:r>
+              <a:rPr lang="en-US" sz="1800">
+                <a:solidFill>
+                  <a:schemeClr val="bg1">
+                    <a:alpha val="80000"/>
+                  </a:schemeClr>
+                </a:solidFill>
+              </a:rPr>
+              <a:t>Using the patch match algorithm, image reconstruction of the input image on the left, using patches from the input image on the right.</a:t>
+            </a:r>
+          </a:p>
+        </p:txBody>
+      </p:sp>
+      <p:sp>
+        <p:nvSpPr>
+          <p:cNvPr id="7" name="TextBox 6">
+            <a:extLst>
+              <a:ext uri="{FF2B5EF4-FFF2-40B4-BE49-F238E27FC236}">
+                <a16:creationId xmlns:a16="http://schemas.microsoft.com/office/drawing/2014/main" id="{C57B499D-5E5B-49B1-B074-0AE3924B32BF}"/>
+              </a:ext>
+            </a:extLst>
+          </p:cNvPr>
+          <p:cNvSpPr txBox="1"/>
+          <p:nvPr/>
+        </p:nvSpPr>
+        <p:spPr>
+          <a:xfrm>
+            <a:off x="1087120" y="2743200"/>
+            <a:ext cx="2743200" cy="369332"/>
+          </a:xfrm>
+          <a:prstGeom prst="rect">
+            <a:avLst/>
+          </a:prstGeom>
+          <a:noFill/>
+        </p:spPr>
+        <p:txBody>
+          <a:bodyPr rot="0" spcFirstLastPara="0" vertOverflow="overflow" horzOverflow="overflow" vert="horz" wrap="square" lIns="91440" tIns="45720" rIns="91440" bIns="45720" numCol="1" spcCol="0" rtlCol="0" fromWordArt="0" anchor="t" anchorCtr="0" forceAA="0" compatLnSpc="1">
+            <a:prstTxWarp prst="textNoShape">
+              <a:avLst/>
+            </a:prstTxWarp>
+            <a:spAutoFit/>
+          </a:bodyPr>
+          <a:lstStyle/>
+          <a:p>
+            <a:r>
+              <a:rPr lang="en-US"/>
+              <a:t>Input images</a:t>
+            </a:r>
+          </a:p>
+        </p:txBody>
+      </p:sp>
+      <p:sp>
+        <p:nvSpPr>
+          <p:cNvPr id="14" name="TextBox 13">
+            <a:extLst>
+              <a:ext uri="{FF2B5EF4-FFF2-40B4-BE49-F238E27FC236}">
+                <a16:creationId xmlns:a16="http://schemas.microsoft.com/office/drawing/2014/main" id="{283DBD7B-9A3E-4CD1-AE7A-538C7CC3627B}"/>
+              </a:ext>
+            </a:extLst>
+          </p:cNvPr>
+          <p:cNvSpPr txBox="1"/>
+          <p:nvPr/>
+        </p:nvSpPr>
+        <p:spPr>
+          <a:xfrm>
+            <a:off x="4562475" y="2743835"/>
+            <a:ext cx="3373120" cy="584775"/>
+          </a:xfrm>
+          <a:prstGeom prst="rect">
+            <a:avLst/>
+          </a:prstGeom>
+          <a:noFill/>
+        </p:spPr>
+        <p:txBody>
+          <a:bodyPr rot="0" spcFirstLastPara="0" vertOverflow="overflow" horzOverflow="overflow" vert="horz" wrap="square" lIns="91440" tIns="45720" rIns="91440" bIns="45720" numCol="1" spcCol="0" rtlCol="0" fromWordArt="0" anchor="t" anchorCtr="0" forceAA="0" compatLnSpc="1">
+            <a:prstTxWarp prst="textNoShape">
+              <a:avLst/>
+            </a:prstTxWarp>
+            <a:spAutoFit/>
+          </a:bodyPr>
+          <a:lstStyle/>
+          <a:p>
+            <a:r>
+              <a:rPr lang="en-US" sz="1600" dirty="0"/>
+              <a:t>Output image from </a:t>
+            </a:r>
+            <a:r>
+              <a:rPr lang="en-US" sz="1600"/>
+              <a:t>patch match: nearest patch distances</a:t>
+            </a:r>
+            <a:endParaRPr lang="en-US" sz="1600" dirty="0"/>
+          </a:p>
+        </p:txBody>
+      </p:sp>
+      <p:sp>
+        <p:nvSpPr>
+          <p:cNvPr id="16" name="TextBox 15">
+            <a:extLst>
+              <a:ext uri="{FF2B5EF4-FFF2-40B4-BE49-F238E27FC236}">
+                <a16:creationId xmlns:a16="http://schemas.microsoft.com/office/drawing/2014/main" id="{1BF60FDE-EC66-4D4A-BD17-B7D73646B6FA}"/>
+              </a:ext>
+            </a:extLst>
+          </p:cNvPr>
+          <p:cNvSpPr txBox="1"/>
+          <p:nvPr/>
+        </p:nvSpPr>
+        <p:spPr>
+          <a:xfrm>
+            <a:off x="8271510" y="2917190"/>
+            <a:ext cx="2743200" cy="369332"/>
+          </a:xfrm>
+          <a:prstGeom prst="rect">
+            <a:avLst/>
+          </a:prstGeom>
+          <a:noFill/>
+        </p:spPr>
+        <p:txBody>
+          <a:bodyPr rot="0" spcFirstLastPara="0" vertOverflow="overflow" horzOverflow="overflow" vert="horz" wrap="square" lIns="91440" tIns="45720" rIns="91440" bIns="45720" numCol="1" spcCol="0" rtlCol="0" fromWordArt="0" anchor="t" anchorCtr="0" forceAA="0" compatLnSpc="1">
+            <a:prstTxWarp prst="textNoShape">
+              <a:avLst/>
+            </a:prstTxWarp>
+            <a:spAutoFit/>
+          </a:bodyPr>
+          <a:lstStyle/>
+          <a:p>
+            <a:r>
+              <a:rPr lang="en-US"/>
+              <a:t>Reconstructed image</a:t>
+            </a:r>
           </a:p>
         </p:txBody>
       </p:sp>
@@ -5724,6 +6385,14 @@
 <file path=ppt/slides/slide8.xml><?xml version="1.0" encoding="utf-8"?>
 <p:sld xmlns:a="http://schemas.openxmlformats.org/drawingml/2006/main" xmlns:r="http://schemas.openxmlformats.org/officeDocument/2006/relationships" xmlns:p="http://schemas.openxmlformats.org/presentationml/2006/main">
   <p:cSld>
+    <p:bg>
+      <p:bgPr>
+        <a:solidFill>
+          <a:schemeClr val="bg1"/>
+        </a:solidFill>
+        <a:effectLst/>
+      </p:bgPr>
+    </p:bg>
     <p:spTree>
       <p:nvGrpSpPr>
         <p:cNvPr id="1" name=""/>
@@ -5740,10 +6409,419 @@
       </p:grpSpPr>
       <p:sp>
         <p:nvSpPr>
+          <p:cNvPr id="23" name="Rectangle 25">
+            <a:extLst>
+              <a:ext uri="{FF2B5EF4-FFF2-40B4-BE49-F238E27FC236}">
+                <a16:creationId xmlns:a16="http://schemas.microsoft.com/office/drawing/2014/main" id="{0BABF38A-8A0D-492E-BD20-6CF4D46B50BD}"/>
+              </a:ext>
+              <a:ext uri="{C183D7F6-B498-43B3-948B-1728B52AA6E4}">
+                <adec:decorative xmlns:adec="http://schemas.microsoft.com/office/drawing/2017/decorative" val="1"/>
+              </a:ext>
+            </a:extLst>
+          </p:cNvPr>
+          <p:cNvSpPr>
+            <a:spLocks noGrp="1" noRot="1" noChangeAspect="1" noMove="1" noResize="1" noEditPoints="1" noAdjustHandles="1" noChangeArrowheads="1" noChangeShapeType="1" noTextEdit="1"/>
+          </p:cNvSpPr>
+          <p:nvPr>
+            <p:extLst>
+              <p:ext uri="{386F3935-93C4-4BCD-93E2-E3B085C9AB24}">
+                <p16:designElem xmlns:p16="http://schemas.microsoft.com/office/powerpoint/2015/main" val="1"/>
+              </p:ext>
+            </p:extLst>
+          </p:nvPr>
+        </p:nvSpPr>
+        <p:spPr>
+          <a:xfrm>
+            <a:off x="0" y="1"/>
+            <a:ext cx="12192000" cy="6858004"/>
+          </a:xfrm>
+          <a:prstGeom prst="rect">
+            <a:avLst/>
+          </a:prstGeom>
+          <a:solidFill>
+            <a:schemeClr val="tx2">
+              <a:lumMod val="90000"/>
+              <a:lumOff val="10000"/>
+            </a:schemeClr>
+          </a:solidFill>
+          <a:ln>
+            <a:noFill/>
+          </a:ln>
+        </p:spPr>
+        <p:style>
+          <a:lnRef idx="2">
+            <a:schemeClr val="accent1">
+              <a:shade val="50000"/>
+            </a:schemeClr>
+          </a:lnRef>
+          <a:fillRef idx="1">
+            <a:schemeClr val="accent1"/>
+          </a:fillRef>
+          <a:effectRef idx="0">
+            <a:schemeClr val="accent1"/>
+          </a:effectRef>
+          <a:fontRef idx="minor">
+            <a:schemeClr val="lt1"/>
+          </a:fontRef>
+        </p:style>
+        <p:txBody>
+          <a:bodyPr rtlCol="0" anchor="ctr"/>
+          <a:lstStyle/>
+          <a:p>
+            <a:pPr algn="ctr"/>
+            <a:endParaRPr lang="en-US" dirty="0">
+              <a:solidFill>
+                <a:schemeClr val="tx1">
+                  <a:lumMod val="65000"/>
+                  <a:lumOff val="35000"/>
+                </a:schemeClr>
+              </a:solidFill>
+              <a:latin typeface="AvenirNext LT Pro Medium" panose="020B0504020202020204" pitchFamily="34" charset="0"/>
+            </a:endParaRPr>
+          </a:p>
+        </p:txBody>
+      </p:sp>
+      <p:pic>
+        <p:nvPicPr>
+          <p:cNvPr id="28" name="Picture 27">
+            <a:extLst>
+              <a:ext uri="{FF2B5EF4-FFF2-40B4-BE49-F238E27FC236}">
+                <a16:creationId xmlns:a16="http://schemas.microsoft.com/office/drawing/2014/main" id="{1CB7E8AE-A3AC-4BB7-A5C6-F00EC697B265}"/>
+              </a:ext>
+              <a:ext uri="{C183D7F6-B498-43B3-948B-1728B52AA6E4}">
+                <adec:decorative xmlns:adec="http://schemas.microsoft.com/office/drawing/2017/decorative" val="1"/>
+              </a:ext>
+            </a:extLst>
+          </p:cNvPr>
+          <p:cNvPicPr>
+            <a:picLocks noGrp="1" noRot="1" noChangeAspect="1" noMove="1" noResize="1" noEditPoints="1" noAdjustHandles="1" noChangeArrowheads="1" noChangeShapeType="1" noCrop="1"/>
+          </p:cNvPicPr>
+          <p:nvPr>
+            <p:extLst>
+              <p:ext uri="{386F3935-93C4-4BCD-93E2-E3B085C9AB24}">
+                <p16:designElem xmlns:p16="http://schemas.microsoft.com/office/powerpoint/2015/main" val="1"/>
+              </p:ext>
+            </p:extLst>
+          </p:nvPr>
+        </p:nvPicPr>
+        <p:blipFill>
+          <a:blip r:embed="rId2">
+            <a:alphaModFix amt="35000"/>
+            <a:extLst>
+              <a:ext uri="{28A0092B-C50C-407E-A947-70E740481C1C}">
+                <a14:useLocalDpi xmlns:a14="http://schemas.microsoft.com/office/drawing/2010/main" val="0"/>
+              </a:ext>
+            </a:extLst>
+          </a:blip>
+          <a:stretch>
+            <a:fillRect/>
+          </a:stretch>
+        </p:blipFill>
+        <p:spPr>
+          <a:xfrm>
+            <a:off x="0" y="1"/>
+            <a:ext cx="12192000" cy="1392401"/>
+          </a:xfrm>
+          <a:prstGeom prst="rect">
+            <a:avLst/>
+          </a:prstGeom>
+        </p:spPr>
+      </p:pic>
+      <p:sp useBgFill="1">
+        <p:nvSpPr>
+          <p:cNvPr id="30" name="Rectangle 29">
+            <a:extLst>
+              <a:ext uri="{FF2B5EF4-FFF2-40B4-BE49-F238E27FC236}">
+                <a16:creationId xmlns:a16="http://schemas.microsoft.com/office/drawing/2014/main" id="{310E06F9-9F12-4D1B-92C0-4B30818D093E}"/>
+              </a:ext>
+              <a:ext uri="{C183D7F6-B498-43B3-948B-1728B52AA6E4}">
+                <adec:decorative xmlns:adec="http://schemas.microsoft.com/office/drawing/2017/decorative" val="1"/>
+              </a:ext>
+            </a:extLst>
+          </p:cNvPr>
+          <p:cNvSpPr>
+            <a:spLocks noGrp="1" noRot="1" noChangeAspect="1" noMove="1" noResize="1" noEditPoints="1" noAdjustHandles="1" noChangeArrowheads="1" noChangeShapeType="1" noTextEdit="1"/>
+          </p:cNvSpPr>
+          <p:nvPr>
+            <p:extLst>
+              <p:ext uri="{386F3935-93C4-4BCD-93E2-E3B085C9AB24}">
+                <p16:designElem xmlns:p16="http://schemas.microsoft.com/office/powerpoint/2015/main" val="1"/>
+              </p:ext>
+            </p:extLst>
+          </p:nvPr>
+        </p:nvSpPr>
+        <p:spPr>
+          <a:xfrm>
+            <a:off x="0" y="0"/>
+            <a:ext cx="12188952" cy="6858000"/>
+          </a:xfrm>
+          <a:prstGeom prst="rect">
+            <a:avLst/>
+          </a:prstGeom>
+          <a:ln>
+            <a:noFill/>
+          </a:ln>
+        </p:spPr>
+        <p:style>
+          <a:lnRef idx="2">
+            <a:schemeClr val="accent1">
+              <a:shade val="50000"/>
+            </a:schemeClr>
+          </a:lnRef>
+          <a:fillRef idx="1">
+            <a:schemeClr val="accent1"/>
+          </a:fillRef>
+          <a:effectRef idx="0">
+            <a:schemeClr val="accent1"/>
+          </a:effectRef>
+          <a:fontRef idx="minor">
+            <a:schemeClr val="lt1"/>
+          </a:fontRef>
+        </p:style>
+        <p:txBody>
+          <a:bodyPr rtlCol="0" anchor="ctr"/>
+          <a:lstStyle/>
+          <a:p>
+            <a:pPr algn="ctr"/>
+            <a:endParaRPr lang="en-US" dirty="0">
+              <a:solidFill>
+                <a:schemeClr val="tx1">
+                  <a:lumMod val="65000"/>
+                  <a:lumOff val="35000"/>
+                </a:schemeClr>
+              </a:solidFill>
+              <a:latin typeface="AvenirNext LT Pro Medium" panose="020B0504020202020204" pitchFamily="34" charset="0"/>
+            </a:endParaRPr>
+          </a:p>
+        </p:txBody>
+      </p:sp>
+      <p:sp>
+        <p:nvSpPr>
+          <p:cNvPr id="32" name="Rectangle 31">
+            <a:extLst>
+              <a:ext uri="{FF2B5EF4-FFF2-40B4-BE49-F238E27FC236}">
+                <a16:creationId xmlns:a16="http://schemas.microsoft.com/office/drawing/2014/main" id="{7DA29CF3-8B8B-4DDF-A19B-72E0059DD5DC}"/>
+              </a:ext>
+              <a:ext uri="{C183D7F6-B498-43B3-948B-1728B52AA6E4}">
+                <adec:decorative xmlns:adec="http://schemas.microsoft.com/office/drawing/2017/decorative" val="1"/>
+              </a:ext>
+            </a:extLst>
+          </p:cNvPr>
+          <p:cNvSpPr>
+            <a:spLocks noGrp="1" noRot="1" noChangeAspect="1" noMove="1" noResize="1" noEditPoints="1" noAdjustHandles="1" noChangeArrowheads="1" noChangeShapeType="1" noTextEdit="1"/>
+          </p:cNvSpPr>
+          <p:nvPr>
+            <p:extLst>
+              <p:ext uri="{386F3935-93C4-4BCD-93E2-E3B085C9AB24}">
+                <p16:designElem xmlns:p16="http://schemas.microsoft.com/office/powerpoint/2015/main" val="1"/>
+              </p:ext>
+            </p:extLst>
+          </p:nvPr>
+        </p:nvSpPr>
+        <p:spPr>
+          <a:xfrm>
+            <a:off x="3048" y="0"/>
+            <a:ext cx="12188952" cy="6858000"/>
+          </a:xfrm>
+          <a:prstGeom prst="rect">
+            <a:avLst/>
+          </a:prstGeom>
+          <a:solidFill>
+            <a:schemeClr val="bg2">
+              <a:alpha val="70000"/>
+            </a:schemeClr>
+          </a:solidFill>
+          <a:ln>
+            <a:noFill/>
+          </a:ln>
+        </p:spPr>
+        <p:style>
+          <a:lnRef idx="2">
+            <a:schemeClr val="accent1">
+              <a:shade val="50000"/>
+            </a:schemeClr>
+          </a:lnRef>
+          <a:fillRef idx="1">
+            <a:schemeClr val="accent1"/>
+          </a:fillRef>
+          <a:effectRef idx="0">
+            <a:schemeClr val="accent1"/>
+          </a:effectRef>
+          <a:fontRef idx="minor">
+            <a:schemeClr val="lt1"/>
+          </a:fontRef>
+        </p:style>
+        <p:txBody>
+          <a:bodyPr rtlCol="0" anchor="ctr"/>
+          <a:lstStyle/>
+          <a:p>
+            <a:pPr algn="ctr"/>
+            <a:endParaRPr lang="en-US">
+              <a:solidFill>
+                <a:schemeClr val="tx1">
+                  <a:lumMod val="65000"/>
+                  <a:lumOff val="35000"/>
+                </a:schemeClr>
+              </a:solidFill>
+              <a:latin typeface="AvenirNext LT Pro Medium" panose="020B0504020202020204" pitchFamily="34" charset="0"/>
+            </a:endParaRPr>
+          </a:p>
+        </p:txBody>
+      </p:sp>
+      <p:sp>
+        <p:nvSpPr>
+          <p:cNvPr id="34" name="Rectangle 33">
+            <a:extLst>
+              <a:ext uri="{FF2B5EF4-FFF2-40B4-BE49-F238E27FC236}">
+                <a16:creationId xmlns:a16="http://schemas.microsoft.com/office/drawing/2014/main" id="{CDC57656-A01F-4B32-B5C4-D171EDC97127}"/>
+              </a:ext>
+              <a:ext uri="{C183D7F6-B498-43B3-948B-1728B52AA6E4}">
+                <adec:decorative xmlns:adec="http://schemas.microsoft.com/office/drawing/2017/decorative" val="1"/>
+              </a:ext>
+            </a:extLst>
+          </p:cNvPr>
+          <p:cNvSpPr>
+            <a:spLocks noGrp="1" noRot="1" noChangeAspect="1" noMove="1" noResize="1" noEditPoints="1" noAdjustHandles="1" noChangeArrowheads="1" noChangeShapeType="1" noTextEdit="1"/>
+          </p:cNvSpPr>
+          <p:nvPr>
+            <p:extLst>
+              <p:ext uri="{386F3935-93C4-4BCD-93E2-E3B085C9AB24}">
+                <p16:designElem xmlns:p16="http://schemas.microsoft.com/office/powerpoint/2015/main" val="1"/>
+              </p:ext>
+            </p:extLst>
+          </p:nvPr>
+        </p:nvSpPr>
+        <p:spPr>
+          <a:xfrm>
+            <a:off x="0" y="0"/>
+            <a:ext cx="12192000" cy="3336410"/>
+          </a:xfrm>
+          <a:prstGeom prst="rect">
+            <a:avLst/>
+          </a:prstGeom>
+          <a:solidFill>
+            <a:schemeClr val="tx2">
+              <a:lumMod val="90000"/>
+              <a:lumOff val="10000"/>
+            </a:schemeClr>
+          </a:solidFill>
+          <a:ln>
+            <a:noFill/>
+          </a:ln>
+        </p:spPr>
+        <p:style>
+          <a:lnRef idx="2">
+            <a:schemeClr val="accent1">
+              <a:shade val="50000"/>
+            </a:schemeClr>
+          </a:lnRef>
+          <a:fillRef idx="1">
+            <a:schemeClr val="accent1"/>
+          </a:fillRef>
+          <a:effectRef idx="0">
+            <a:schemeClr val="accent1"/>
+          </a:effectRef>
+          <a:fontRef idx="minor">
+            <a:schemeClr val="lt1"/>
+          </a:fontRef>
+        </p:style>
+        <p:txBody>
+          <a:bodyPr rtlCol="0" anchor="ctr"/>
+          <a:lstStyle/>
+          <a:p>
+            <a:pPr algn="ctr"/>
+            <a:endParaRPr lang="en-US" dirty="0">
+              <a:solidFill>
+                <a:schemeClr val="tx1">
+                  <a:lumMod val="65000"/>
+                  <a:lumOff val="35000"/>
+                </a:schemeClr>
+              </a:solidFill>
+              <a:latin typeface="AvenirNext LT Pro Medium" panose="020B0504020202020204" pitchFamily="34" charset="0"/>
+            </a:endParaRPr>
+          </a:p>
+        </p:txBody>
+      </p:sp>
+      <p:sp>
+        <p:nvSpPr>
+          <p:cNvPr id="36" name="Rectangle 35">
+            <a:extLst>
+              <a:ext uri="{FF2B5EF4-FFF2-40B4-BE49-F238E27FC236}">
+                <a16:creationId xmlns:a16="http://schemas.microsoft.com/office/drawing/2014/main" id="{CDEA49F7-1946-40FE-ACF9-81D0AC97CAF9}"/>
+              </a:ext>
+              <a:ext uri="{C183D7F6-B498-43B3-948B-1728B52AA6E4}">
+                <adec:decorative xmlns:adec="http://schemas.microsoft.com/office/drawing/2017/decorative" val="1"/>
+              </a:ext>
+            </a:extLst>
+          </p:cNvPr>
+          <p:cNvSpPr>
+            <a:spLocks noGrp="1" noRot="1" noChangeAspect="1" noMove="1" noResize="1" noEditPoints="1" noAdjustHandles="1" noChangeArrowheads="1" noChangeShapeType="1" noTextEdit="1"/>
+          </p:cNvSpPr>
+          <p:nvPr>
+            <p:extLst>
+              <p:ext uri="{386F3935-93C4-4BCD-93E2-E3B085C9AB24}">
+                <p16:designElem xmlns:p16="http://schemas.microsoft.com/office/powerpoint/2015/main" val="1"/>
+              </p:ext>
+            </p:extLst>
+          </p:nvPr>
+        </p:nvSpPr>
+        <p:spPr>
+          <a:xfrm rot="10800000">
+            <a:off x="-3059" y="0"/>
+            <a:ext cx="12191999" cy="3337560"/>
+          </a:xfrm>
+          <a:prstGeom prst="rect">
+            <a:avLst/>
+          </a:prstGeom>
+          <a:blipFill dpi="0" rotWithShape="1">
+            <a:blip r:embed="rId3">
+              <a:alphaModFix amt="20000"/>
+              <a:duotone>
+                <a:schemeClr val="accent1">
+                  <a:shade val="45000"/>
+                  <a:satMod val="135000"/>
+                </a:schemeClr>
+                <a:prstClr val="white"/>
+              </a:duotone>
+            </a:blip>
+            <a:srcRect/>
+            <a:tile tx="889000" ty="0" sx="100000" sy="100000" flip="none" algn="tl"/>
+          </a:blipFill>
+          <a:ln>
+            <a:noFill/>
+          </a:ln>
+        </p:spPr>
+        <p:style>
+          <a:lnRef idx="2">
+            <a:schemeClr val="accent1">
+              <a:shade val="50000"/>
+            </a:schemeClr>
+          </a:lnRef>
+          <a:fillRef idx="1">
+            <a:schemeClr val="accent1"/>
+          </a:fillRef>
+          <a:effectRef idx="0">
+            <a:schemeClr val="accent1"/>
+          </a:effectRef>
+          <a:fontRef idx="minor">
+            <a:schemeClr val="lt1"/>
+          </a:fontRef>
+        </p:style>
+        <p:txBody>
+          <a:bodyPr rtlCol="0" anchor="ctr"/>
+          <a:lstStyle/>
+          <a:p>
+            <a:pPr algn="ctr"/>
+            <a:endParaRPr lang="en-US" dirty="0"/>
+          </a:p>
+        </p:txBody>
+      </p:sp>
+      <p:sp>
+        <p:nvSpPr>
           <p:cNvPr id="2" name="Title 1">
             <a:extLst>
               <a:ext uri="{FF2B5EF4-FFF2-40B4-BE49-F238E27FC236}">
-                <a16:creationId xmlns:a16="http://schemas.microsoft.com/office/drawing/2014/main" id="{408EC014-DA8A-4789-9C85-E3750E517F8B}"/>
+                <a16:creationId xmlns:a16="http://schemas.microsoft.com/office/drawing/2014/main" id="{984ABC17-EC24-44CE-9864-F31756836972}"/>
               </a:ext>
             </a:extLst>
           </p:cNvPr>
@@ -5754,76 +6832,1015 @@
             <p:ph type="title"/>
           </p:nvPr>
         </p:nvSpPr>
-        <p:spPr/>
-        <p:txBody>
-          <a:bodyPr/>
-          <a:lstStyle/>
-          <a:p>
-            <a:r>
-              <a:rPr lang="en-US" dirty="0"/>
-              <a:t>What remains?</a:t>
-            </a:r>
-          </a:p>
-        </p:txBody>
-      </p:sp>
-      <p:sp>
-        <p:nvSpPr>
-          <p:cNvPr id="3" name="Content Placeholder 2">
-            <a:extLst>
-              <a:ext uri="{FF2B5EF4-FFF2-40B4-BE49-F238E27FC236}">
-                <a16:creationId xmlns:a16="http://schemas.microsoft.com/office/drawing/2014/main" id="{7ED3250B-1ECC-4F0F-9FD2-DF2894702547}"/>
-              </a:ext>
-            </a:extLst>
-          </p:cNvPr>
-          <p:cNvSpPr>
-            <a:spLocks noGrp="1"/>
-          </p:cNvSpPr>
-          <p:nvPr>
-            <p:ph idx="1"/>
-          </p:nvPr>
-        </p:nvSpPr>
-        <p:spPr/>
-        <p:txBody>
-          <a:bodyPr vert="horz" lIns="91440" tIns="45720" rIns="91440" bIns="45720" rtlCol="0" anchor="t">
-            <a:normAutofit lnSpcReduction="10000"/>
+        <p:spPr>
+          <a:xfrm>
+            <a:off x="838200" y="744909"/>
+            <a:ext cx="5029200" cy="2150691"/>
+          </a:xfrm>
+        </p:spPr>
+        <p:txBody>
+          <a:bodyPr vert="horz" lIns="91440" tIns="45720" rIns="91440" bIns="45720" rtlCol="0" anchor="b">
+            <a:normAutofit/>
           </a:bodyPr>
           <a:lstStyle/>
           <a:p>
             <a:r>
-              <a:rPr lang="en-US" dirty="0"/>
-              <a:t>Further applying the basic patch match algorithm to the datasets given in the proposal – depending on the degree of visual similarity. </a:t>
-            </a:r>
-          </a:p>
-          <a:p>
-            <a:r>
-              <a:rPr lang="en-US" dirty="0"/>
-              <a:t>A GUI needs to be built for the interactive tool, in order to show a visualization and efficacy of the speed enhancements patch match provides.</a:t>
-            </a:r>
-          </a:p>
-          <a:p>
-            <a:r>
-              <a:rPr lang="en-US" dirty="0"/>
-              <a:t>The GUI will have user input capabilities.</a:t>
-            </a:r>
-          </a:p>
-          <a:p>
-            <a:r>
-              <a:rPr lang="en-US" dirty="0"/>
-              <a:t>Applying the patch match algorithm to certain use-cases.</a:t>
-            </a:r>
-          </a:p>
-          <a:p>
-            <a:endParaRPr lang="en-US" dirty="0"/>
-          </a:p>
-          <a:p>
-            <a:endParaRPr lang="en-US" dirty="0"/>
+              <a:rPr lang="en-US"/>
+              <a:t>Results - 2</a:t>
+            </a:r>
+          </a:p>
+        </p:txBody>
+      </p:sp>
+      <p:pic>
+        <p:nvPicPr>
+          <p:cNvPr id="4" name="Picture 4" descr="A picture containing calendar&#10;&#10;Description automatically generated">
+            <a:extLst>
+              <a:ext uri="{FF2B5EF4-FFF2-40B4-BE49-F238E27FC236}">
+                <a16:creationId xmlns:a16="http://schemas.microsoft.com/office/drawing/2014/main" id="{340369C2-0C48-4CF9-8AA4-87A08E1A769E}"/>
+              </a:ext>
+            </a:extLst>
+          </p:cNvPr>
+          <p:cNvPicPr>
+            <a:picLocks noChangeAspect="1"/>
+          </p:cNvPicPr>
+          <p:nvPr/>
+        </p:nvPicPr>
+        <p:blipFill>
+          <a:blip r:embed="rId4"/>
+          <a:stretch>
+            <a:fillRect/>
+          </a:stretch>
+        </p:blipFill>
+        <p:spPr>
+          <a:xfrm>
+            <a:off x="4199575" y="3826241"/>
+            <a:ext cx="3503568" cy="2329872"/>
+          </a:xfrm>
+          <a:prstGeom prst="rect">
+            <a:avLst/>
+          </a:prstGeom>
+        </p:spPr>
+      </p:pic>
+      <p:pic>
+        <p:nvPicPr>
+          <p:cNvPr id="3" name="Picture 3" descr="A screen shot of a person&#10;&#10;Description automatically generated">
+            <a:extLst>
+              <a:ext uri="{FF2B5EF4-FFF2-40B4-BE49-F238E27FC236}">
+                <a16:creationId xmlns:a16="http://schemas.microsoft.com/office/drawing/2014/main" id="{2DE1FD4E-9C74-4B62-9FA4-A1D75277FAD0}"/>
+              </a:ext>
+            </a:extLst>
+          </p:cNvPr>
+          <p:cNvPicPr>
+            <a:picLocks noChangeAspect="1"/>
+          </p:cNvPicPr>
+          <p:nvPr/>
+        </p:nvPicPr>
+        <p:blipFill>
+          <a:blip r:embed="rId5"/>
+          <a:stretch>
+            <a:fillRect/>
+          </a:stretch>
+        </p:blipFill>
+        <p:spPr>
+          <a:xfrm>
+            <a:off x="244372" y="4423082"/>
+            <a:ext cx="3839416" cy="1606845"/>
+          </a:xfrm>
+          <a:prstGeom prst="rect">
+            <a:avLst/>
+          </a:prstGeom>
+        </p:spPr>
+      </p:pic>
+      <p:pic>
+        <p:nvPicPr>
+          <p:cNvPr id="5" name="Picture 5" descr="A picture containing calendar&#10;&#10;Description automatically generated">
+            <a:extLst>
+              <a:ext uri="{FF2B5EF4-FFF2-40B4-BE49-F238E27FC236}">
+                <a16:creationId xmlns:a16="http://schemas.microsoft.com/office/drawing/2014/main" id="{90C5A5BB-722F-4052-9FB2-C449267ACE87}"/>
+              </a:ext>
+            </a:extLst>
+          </p:cNvPr>
+          <p:cNvPicPr>
+            <a:picLocks noChangeAspect="1"/>
+          </p:cNvPicPr>
+          <p:nvPr/>
+        </p:nvPicPr>
+        <p:blipFill>
+          <a:blip r:embed="rId6"/>
+          <a:stretch>
+            <a:fillRect/>
+          </a:stretch>
+        </p:blipFill>
+        <p:spPr>
+          <a:xfrm>
+            <a:off x="8034700" y="3733616"/>
+            <a:ext cx="3504484" cy="2416294"/>
+          </a:xfrm>
+          <a:prstGeom prst="rect">
+            <a:avLst/>
+          </a:prstGeom>
+        </p:spPr>
+      </p:pic>
+      <p:sp>
+        <p:nvSpPr>
+          <p:cNvPr id="7" name="TextBox 6">
+            <a:extLst>
+              <a:ext uri="{FF2B5EF4-FFF2-40B4-BE49-F238E27FC236}">
+                <a16:creationId xmlns:a16="http://schemas.microsoft.com/office/drawing/2014/main" id="{31383811-EAFD-4532-AC82-A008A053EBCC}"/>
+              </a:ext>
+            </a:extLst>
+          </p:cNvPr>
+          <p:cNvSpPr txBox="1"/>
+          <p:nvPr/>
+        </p:nvSpPr>
+        <p:spPr>
+          <a:xfrm>
+            <a:off x="396772" y="6061267"/>
+            <a:ext cx="3687016" cy="375060"/>
+          </a:xfrm>
+          <a:prstGeom prst="rect">
+            <a:avLst/>
+          </a:prstGeom>
+          <a:solidFill>
+            <a:srgbClr val="000000">
+              <a:alpha val="50000"/>
+            </a:srgbClr>
+          </a:solidFill>
+          <a:ln>
+            <a:noFill/>
+          </a:ln>
+        </p:spPr>
+        <p:txBody>
+          <a:bodyPr rot="0" spcFirstLastPara="0" vertOverflow="overflow" horzOverflow="overflow" vert="horz" wrap="square" lIns="91440" tIns="45720" rIns="91440" bIns="45720" numCol="1" spcCol="0" rtlCol="0" fromWordArt="0" anchor="t" anchorCtr="0" forceAA="0" compatLnSpc="1">
+            <a:prstTxWarp prst="textNoShape">
+              <a:avLst/>
+            </a:prstTxWarp>
+            <a:noAutofit/>
+          </a:bodyPr>
+          <a:lstStyle/>
+          <a:p>
+            <a:pPr algn="ctr">
+              <a:spcAft>
+                <a:spcPts val="600"/>
+              </a:spcAft>
+            </a:pPr>
+            <a:r>
+              <a:rPr lang="en-US" sz="1200">
+                <a:solidFill>
+                  <a:srgbClr val="FFFFFF"/>
+                </a:solidFill>
+              </a:rPr>
+              <a:t>Input images</a:t>
+            </a:r>
+          </a:p>
+        </p:txBody>
+      </p:sp>
+      <p:sp>
+        <p:nvSpPr>
+          <p:cNvPr id="9" name="TextBox 8">
+            <a:extLst>
+              <a:ext uri="{FF2B5EF4-FFF2-40B4-BE49-F238E27FC236}">
+                <a16:creationId xmlns:a16="http://schemas.microsoft.com/office/drawing/2014/main" id="{A8AB5D07-5304-4299-9017-732986836599}"/>
+              </a:ext>
+            </a:extLst>
+          </p:cNvPr>
+          <p:cNvSpPr txBox="1"/>
+          <p:nvPr/>
+        </p:nvSpPr>
+        <p:spPr>
+          <a:xfrm>
+            <a:off x="4199575" y="6156806"/>
+            <a:ext cx="3503568" cy="476827"/>
+          </a:xfrm>
+          <a:prstGeom prst="rect">
+            <a:avLst/>
+          </a:prstGeom>
+          <a:solidFill>
+            <a:srgbClr val="000000">
+              <a:alpha val="50000"/>
+            </a:srgbClr>
+          </a:solidFill>
+          <a:ln>
+            <a:noFill/>
+          </a:ln>
+        </p:spPr>
+        <p:txBody>
+          <a:bodyPr rot="0" spcFirstLastPara="0" vertOverflow="overflow" horzOverflow="overflow" vert="horz" wrap="square" lIns="91440" tIns="45720" rIns="91440" bIns="45720" numCol="1" spcCol="0" rtlCol="0" fromWordArt="0" anchor="t" anchorCtr="0" forceAA="0" compatLnSpc="1">
+            <a:prstTxWarp prst="textNoShape">
+              <a:avLst/>
+            </a:prstTxWarp>
+            <a:noAutofit/>
+          </a:bodyPr>
+          <a:lstStyle/>
+          <a:p>
+            <a:pPr algn="ctr">
+              <a:spcAft>
+                <a:spcPts val="600"/>
+              </a:spcAft>
+            </a:pPr>
+            <a:r>
+              <a:rPr lang="en-US" sz="1200">
+                <a:solidFill>
+                  <a:srgbClr val="FFFFFF"/>
+                </a:solidFill>
+              </a:rPr>
+              <a:t>Output image from patch match: nearest patch distances</a:t>
+            </a:r>
+          </a:p>
+        </p:txBody>
+      </p:sp>
+      <p:sp>
+        <p:nvSpPr>
+          <p:cNvPr id="11" name="TextBox 10">
+            <a:extLst>
+              <a:ext uri="{FF2B5EF4-FFF2-40B4-BE49-F238E27FC236}">
+                <a16:creationId xmlns:a16="http://schemas.microsoft.com/office/drawing/2014/main" id="{08F28CAC-E895-4F65-A6EA-344CE062484B}"/>
+              </a:ext>
+            </a:extLst>
+          </p:cNvPr>
+          <p:cNvSpPr txBox="1"/>
+          <p:nvPr/>
+        </p:nvSpPr>
+        <p:spPr>
+          <a:xfrm>
+            <a:off x="8034700" y="6091161"/>
+            <a:ext cx="3504484" cy="312749"/>
+          </a:xfrm>
+          <a:prstGeom prst="rect">
+            <a:avLst/>
+          </a:prstGeom>
+          <a:solidFill>
+            <a:srgbClr val="000000">
+              <a:alpha val="50000"/>
+            </a:srgbClr>
+          </a:solidFill>
+          <a:ln>
+            <a:noFill/>
+          </a:ln>
+        </p:spPr>
+        <p:txBody>
+          <a:bodyPr rot="0" spcFirstLastPara="0" vertOverflow="overflow" horzOverflow="overflow" vert="horz" wrap="square" lIns="91440" tIns="45720" rIns="91440" bIns="45720" numCol="1" spcCol="0" rtlCol="0" fromWordArt="0" anchor="t" anchorCtr="0" forceAA="0" compatLnSpc="1">
+            <a:prstTxWarp prst="textNoShape">
+              <a:avLst/>
+            </a:prstTxWarp>
+            <a:noAutofit/>
+          </a:bodyPr>
+          <a:lstStyle/>
+          <a:p>
+            <a:pPr algn="ctr">
+              <a:spcAft>
+                <a:spcPts val="600"/>
+              </a:spcAft>
+            </a:pPr>
+            <a:r>
+              <a:rPr lang="en-US" sz="1200">
+                <a:solidFill>
+                  <a:srgbClr val="FFFFFF"/>
+                </a:solidFill>
+              </a:rPr>
+              <a:t>Reconstructed image</a:t>
+            </a:r>
           </a:p>
         </p:txBody>
       </p:sp>
     </p:spTree>
     <p:extLst>
       <p:ext uri="{BB962C8B-B14F-4D97-AF65-F5344CB8AC3E}">
-        <p14:creationId xmlns:p14="http://schemas.microsoft.com/office/powerpoint/2010/main" val="58602504"/>
+        <p14:creationId xmlns:p14="http://schemas.microsoft.com/office/powerpoint/2010/main" val="431119972"/>
+      </p:ext>
+    </p:extLst>
+  </p:cSld>
+  <p:clrMapOvr>
+    <a:masterClrMapping/>
+  </p:clrMapOvr>
+</p:sld>
+</file>
+
+<file path=ppt/slides/slide9.xml><?xml version="1.0" encoding="utf-8"?>
+<p:sld xmlns:a="http://schemas.openxmlformats.org/drawingml/2006/main" xmlns:r="http://schemas.openxmlformats.org/officeDocument/2006/relationships" xmlns:p="http://schemas.openxmlformats.org/presentationml/2006/main">
+  <p:cSld>
+    <p:bg>
+      <p:bgPr>
+        <a:solidFill>
+          <a:schemeClr val="bg1"/>
+        </a:solidFill>
+        <a:effectLst/>
+      </p:bgPr>
+    </p:bg>
+    <p:spTree>
+      <p:nvGrpSpPr>
+        <p:cNvPr id="1" name=""/>
+        <p:cNvGrpSpPr/>
+        <p:nvPr/>
+      </p:nvGrpSpPr>
+      <p:grpSpPr>
+        <a:xfrm>
+          <a:off x="0" y="0"/>
+          <a:ext cx="0" cy="0"/>
+          <a:chOff x="0" y="0"/>
+          <a:chExt cx="0" cy="0"/>
+        </a:xfrm>
+      </p:grpSpPr>
+      <p:sp>
+        <p:nvSpPr>
+          <p:cNvPr id="14" name="Rectangle 16">
+            <a:extLst>
+              <a:ext uri="{FF2B5EF4-FFF2-40B4-BE49-F238E27FC236}">
+                <a16:creationId xmlns:a16="http://schemas.microsoft.com/office/drawing/2014/main" id="{0BABF38A-8A0D-492E-BD20-6CF4D46B50BD}"/>
+              </a:ext>
+              <a:ext uri="{C183D7F6-B498-43B3-948B-1728B52AA6E4}">
+                <adec:decorative xmlns:adec="http://schemas.microsoft.com/office/drawing/2017/decorative" val="1"/>
+              </a:ext>
+            </a:extLst>
+          </p:cNvPr>
+          <p:cNvSpPr>
+            <a:spLocks noGrp="1" noRot="1" noChangeAspect="1" noMove="1" noResize="1" noEditPoints="1" noAdjustHandles="1" noChangeArrowheads="1" noChangeShapeType="1" noTextEdit="1"/>
+          </p:cNvSpPr>
+          <p:nvPr>
+            <p:extLst>
+              <p:ext uri="{386F3935-93C4-4BCD-93E2-E3B085C9AB24}">
+                <p16:designElem xmlns:p16="http://schemas.microsoft.com/office/powerpoint/2015/main" val="1"/>
+              </p:ext>
+            </p:extLst>
+          </p:nvPr>
+        </p:nvSpPr>
+        <p:spPr>
+          <a:xfrm>
+            <a:off x="0" y="1"/>
+            <a:ext cx="12192000" cy="6858004"/>
+          </a:xfrm>
+          <a:prstGeom prst="rect">
+            <a:avLst/>
+          </a:prstGeom>
+          <a:solidFill>
+            <a:schemeClr val="tx2">
+              <a:lumMod val="90000"/>
+              <a:lumOff val="10000"/>
+            </a:schemeClr>
+          </a:solidFill>
+          <a:ln>
+            <a:noFill/>
+          </a:ln>
+        </p:spPr>
+        <p:style>
+          <a:lnRef idx="2">
+            <a:schemeClr val="accent1">
+              <a:shade val="50000"/>
+            </a:schemeClr>
+          </a:lnRef>
+          <a:fillRef idx="1">
+            <a:schemeClr val="accent1"/>
+          </a:fillRef>
+          <a:effectRef idx="0">
+            <a:schemeClr val="accent1"/>
+          </a:effectRef>
+          <a:fontRef idx="minor">
+            <a:schemeClr val="lt1"/>
+          </a:fontRef>
+        </p:style>
+        <p:txBody>
+          <a:bodyPr rtlCol="0" anchor="ctr"/>
+          <a:lstStyle/>
+          <a:p>
+            <a:pPr algn="ctr"/>
+            <a:endParaRPr lang="en-US" dirty="0">
+              <a:solidFill>
+                <a:schemeClr val="tx1">
+                  <a:lumMod val="65000"/>
+                  <a:lumOff val="35000"/>
+                </a:schemeClr>
+              </a:solidFill>
+              <a:latin typeface="AvenirNext LT Pro Medium" panose="020B0504020202020204" pitchFamily="34" charset="0"/>
+            </a:endParaRPr>
+          </a:p>
+        </p:txBody>
+      </p:sp>
+      <p:pic>
+        <p:nvPicPr>
+          <p:cNvPr id="15" name="Picture 18">
+            <a:extLst>
+              <a:ext uri="{FF2B5EF4-FFF2-40B4-BE49-F238E27FC236}">
+                <a16:creationId xmlns:a16="http://schemas.microsoft.com/office/drawing/2014/main" id="{1CB7E8AE-A3AC-4BB7-A5C6-F00EC697B265}"/>
+              </a:ext>
+              <a:ext uri="{C183D7F6-B498-43B3-948B-1728B52AA6E4}">
+                <adec:decorative xmlns:adec="http://schemas.microsoft.com/office/drawing/2017/decorative" val="1"/>
+              </a:ext>
+            </a:extLst>
+          </p:cNvPr>
+          <p:cNvPicPr>
+            <a:picLocks noGrp="1" noRot="1" noChangeAspect="1" noMove="1" noResize="1" noEditPoints="1" noAdjustHandles="1" noChangeArrowheads="1" noChangeShapeType="1" noCrop="1"/>
+          </p:cNvPicPr>
+          <p:nvPr>
+            <p:extLst>
+              <p:ext uri="{386F3935-93C4-4BCD-93E2-E3B085C9AB24}">
+                <p16:designElem xmlns:p16="http://schemas.microsoft.com/office/powerpoint/2015/main" val="1"/>
+              </p:ext>
+            </p:extLst>
+          </p:nvPr>
+        </p:nvPicPr>
+        <p:blipFill>
+          <a:blip r:embed="rId2">
+            <a:alphaModFix amt="35000"/>
+            <a:extLst>
+              <a:ext uri="{28A0092B-C50C-407E-A947-70E740481C1C}">
+                <a14:useLocalDpi xmlns:a14="http://schemas.microsoft.com/office/drawing/2010/main" val="0"/>
+              </a:ext>
+            </a:extLst>
+          </a:blip>
+          <a:stretch>
+            <a:fillRect/>
+          </a:stretch>
+        </p:blipFill>
+        <p:spPr>
+          <a:xfrm>
+            <a:off x="0" y="1"/>
+            <a:ext cx="12192000" cy="1392401"/>
+          </a:xfrm>
+          <a:prstGeom prst="rect">
+            <a:avLst/>
+          </a:prstGeom>
+        </p:spPr>
+      </p:pic>
+      <p:sp useBgFill="1">
+        <p:nvSpPr>
+          <p:cNvPr id="16" name="Rectangle 20">
+            <a:extLst>
+              <a:ext uri="{FF2B5EF4-FFF2-40B4-BE49-F238E27FC236}">
+                <a16:creationId xmlns:a16="http://schemas.microsoft.com/office/drawing/2014/main" id="{310E06F9-9F12-4D1B-92C0-4B30818D093E}"/>
+              </a:ext>
+              <a:ext uri="{C183D7F6-B498-43B3-948B-1728B52AA6E4}">
+                <adec:decorative xmlns:adec="http://schemas.microsoft.com/office/drawing/2017/decorative" val="1"/>
+              </a:ext>
+            </a:extLst>
+          </p:cNvPr>
+          <p:cNvSpPr>
+            <a:spLocks noGrp="1" noRot="1" noChangeAspect="1" noMove="1" noResize="1" noEditPoints="1" noAdjustHandles="1" noChangeArrowheads="1" noChangeShapeType="1" noTextEdit="1"/>
+          </p:cNvSpPr>
+          <p:nvPr>
+            <p:extLst>
+              <p:ext uri="{386F3935-93C4-4BCD-93E2-E3B085C9AB24}">
+                <p16:designElem xmlns:p16="http://schemas.microsoft.com/office/powerpoint/2015/main" val="1"/>
+              </p:ext>
+            </p:extLst>
+          </p:nvPr>
+        </p:nvSpPr>
+        <p:spPr>
+          <a:xfrm>
+            <a:off x="0" y="0"/>
+            <a:ext cx="12188952" cy="6858000"/>
+          </a:xfrm>
+          <a:prstGeom prst="rect">
+            <a:avLst/>
+          </a:prstGeom>
+          <a:ln>
+            <a:noFill/>
+          </a:ln>
+        </p:spPr>
+        <p:style>
+          <a:lnRef idx="2">
+            <a:schemeClr val="accent1">
+              <a:shade val="50000"/>
+            </a:schemeClr>
+          </a:lnRef>
+          <a:fillRef idx="1">
+            <a:schemeClr val="accent1"/>
+          </a:fillRef>
+          <a:effectRef idx="0">
+            <a:schemeClr val="accent1"/>
+          </a:effectRef>
+          <a:fontRef idx="minor">
+            <a:schemeClr val="lt1"/>
+          </a:fontRef>
+        </p:style>
+        <p:txBody>
+          <a:bodyPr rtlCol="0" anchor="ctr"/>
+          <a:lstStyle/>
+          <a:p>
+            <a:pPr algn="ctr"/>
+            <a:endParaRPr lang="en-US" dirty="0">
+              <a:solidFill>
+                <a:schemeClr val="tx1">
+                  <a:lumMod val="65000"/>
+                  <a:lumOff val="35000"/>
+                </a:schemeClr>
+              </a:solidFill>
+              <a:latin typeface="AvenirNext LT Pro Medium" panose="020B0504020202020204" pitchFamily="34" charset="0"/>
+            </a:endParaRPr>
+          </a:p>
+        </p:txBody>
+      </p:sp>
+      <p:sp>
+        <p:nvSpPr>
+          <p:cNvPr id="18" name="Rectangle 22">
+            <a:extLst>
+              <a:ext uri="{FF2B5EF4-FFF2-40B4-BE49-F238E27FC236}">
+                <a16:creationId xmlns:a16="http://schemas.microsoft.com/office/drawing/2014/main" id="{7DA29CF3-8B8B-4DDF-A19B-72E0059DD5DC}"/>
+              </a:ext>
+              <a:ext uri="{C183D7F6-B498-43B3-948B-1728B52AA6E4}">
+                <adec:decorative xmlns:adec="http://schemas.microsoft.com/office/drawing/2017/decorative" val="1"/>
+              </a:ext>
+            </a:extLst>
+          </p:cNvPr>
+          <p:cNvSpPr>
+            <a:spLocks noGrp="1" noRot="1" noChangeAspect="1" noMove="1" noResize="1" noEditPoints="1" noAdjustHandles="1" noChangeArrowheads="1" noChangeShapeType="1" noTextEdit="1"/>
+          </p:cNvSpPr>
+          <p:nvPr>
+            <p:extLst>
+              <p:ext uri="{386F3935-93C4-4BCD-93E2-E3B085C9AB24}">
+                <p16:designElem xmlns:p16="http://schemas.microsoft.com/office/powerpoint/2015/main" val="1"/>
+              </p:ext>
+            </p:extLst>
+          </p:nvPr>
+        </p:nvSpPr>
+        <p:spPr>
+          <a:xfrm>
+            <a:off x="3048" y="0"/>
+            <a:ext cx="12188952" cy="6858000"/>
+          </a:xfrm>
+          <a:prstGeom prst="rect">
+            <a:avLst/>
+          </a:prstGeom>
+          <a:solidFill>
+            <a:schemeClr val="bg2">
+              <a:alpha val="70000"/>
+            </a:schemeClr>
+          </a:solidFill>
+          <a:ln>
+            <a:noFill/>
+          </a:ln>
+        </p:spPr>
+        <p:style>
+          <a:lnRef idx="2">
+            <a:schemeClr val="accent1">
+              <a:shade val="50000"/>
+            </a:schemeClr>
+          </a:lnRef>
+          <a:fillRef idx="1">
+            <a:schemeClr val="accent1"/>
+          </a:fillRef>
+          <a:effectRef idx="0">
+            <a:schemeClr val="accent1"/>
+          </a:effectRef>
+          <a:fontRef idx="minor">
+            <a:schemeClr val="lt1"/>
+          </a:fontRef>
+        </p:style>
+        <p:txBody>
+          <a:bodyPr rtlCol="0" anchor="ctr"/>
+          <a:lstStyle/>
+          <a:p>
+            <a:pPr algn="ctr"/>
+            <a:endParaRPr lang="en-US">
+              <a:solidFill>
+                <a:schemeClr val="tx1">
+                  <a:lumMod val="65000"/>
+                  <a:lumOff val="35000"/>
+                </a:schemeClr>
+              </a:solidFill>
+              <a:latin typeface="AvenirNext LT Pro Medium" panose="020B0504020202020204" pitchFamily="34" charset="0"/>
+            </a:endParaRPr>
+          </a:p>
+        </p:txBody>
+      </p:sp>
+      <p:sp>
+        <p:nvSpPr>
+          <p:cNvPr id="20" name="Rectangle 24">
+            <a:extLst>
+              <a:ext uri="{FF2B5EF4-FFF2-40B4-BE49-F238E27FC236}">
+                <a16:creationId xmlns:a16="http://schemas.microsoft.com/office/drawing/2014/main" id="{CDC57656-A01F-4B32-B5C4-D171EDC97127}"/>
+              </a:ext>
+              <a:ext uri="{C183D7F6-B498-43B3-948B-1728B52AA6E4}">
+                <adec:decorative xmlns:adec="http://schemas.microsoft.com/office/drawing/2017/decorative" val="1"/>
+              </a:ext>
+            </a:extLst>
+          </p:cNvPr>
+          <p:cNvSpPr>
+            <a:spLocks noGrp="1" noRot="1" noChangeAspect="1" noMove="1" noResize="1" noEditPoints="1" noAdjustHandles="1" noChangeArrowheads="1" noChangeShapeType="1" noTextEdit="1"/>
+          </p:cNvSpPr>
+          <p:nvPr>
+            <p:extLst>
+              <p:ext uri="{386F3935-93C4-4BCD-93E2-E3B085C9AB24}">
+                <p16:designElem xmlns:p16="http://schemas.microsoft.com/office/powerpoint/2015/main" val="1"/>
+              </p:ext>
+            </p:extLst>
+          </p:nvPr>
+        </p:nvSpPr>
+        <p:spPr>
+          <a:xfrm>
+            <a:off x="0" y="0"/>
+            <a:ext cx="12192000" cy="3336410"/>
+          </a:xfrm>
+          <a:prstGeom prst="rect">
+            <a:avLst/>
+          </a:prstGeom>
+          <a:solidFill>
+            <a:schemeClr val="tx2">
+              <a:lumMod val="90000"/>
+              <a:lumOff val="10000"/>
+            </a:schemeClr>
+          </a:solidFill>
+          <a:ln>
+            <a:noFill/>
+          </a:ln>
+        </p:spPr>
+        <p:style>
+          <a:lnRef idx="2">
+            <a:schemeClr val="accent1">
+              <a:shade val="50000"/>
+            </a:schemeClr>
+          </a:lnRef>
+          <a:fillRef idx="1">
+            <a:schemeClr val="accent1"/>
+          </a:fillRef>
+          <a:effectRef idx="0">
+            <a:schemeClr val="accent1"/>
+          </a:effectRef>
+          <a:fontRef idx="minor">
+            <a:schemeClr val="lt1"/>
+          </a:fontRef>
+        </p:style>
+        <p:txBody>
+          <a:bodyPr rtlCol="0" anchor="ctr"/>
+          <a:lstStyle/>
+          <a:p>
+            <a:pPr algn="ctr"/>
+            <a:endParaRPr lang="en-US" dirty="0">
+              <a:solidFill>
+                <a:schemeClr val="tx1">
+                  <a:lumMod val="65000"/>
+                  <a:lumOff val="35000"/>
+                </a:schemeClr>
+              </a:solidFill>
+              <a:latin typeface="AvenirNext LT Pro Medium" panose="020B0504020202020204" pitchFamily="34" charset="0"/>
+            </a:endParaRPr>
+          </a:p>
+        </p:txBody>
+      </p:sp>
+      <p:sp>
+        <p:nvSpPr>
+          <p:cNvPr id="22" name="Rectangle 26">
+            <a:extLst>
+              <a:ext uri="{FF2B5EF4-FFF2-40B4-BE49-F238E27FC236}">
+                <a16:creationId xmlns:a16="http://schemas.microsoft.com/office/drawing/2014/main" id="{CDEA49F7-1946-40FE-ACF9-81D0AC97CAF9}"/>
+              </a:ext>
+              <a:ext uri="{C183D7F6-B498-43B3-948B-1728B52AA6E4}">
+                <adec:decorative xmlns:adec="http://schemas.microsoft.com/office/drawing/2017/decorative" val="1"/>
+              </a:ext>
+            </a:extLst>
+          </p:cNvPr>
+          <p:cNvSpPr>
+            <a:spLocks noGrp="1" noRot="1" noChangeAspect="1" noMove="1" noResize="1" noEditPoints="1" noAdjustHandles="1" noChangeArrowheads="1" noChangeShapeType="1" noTextEdit="1"/>
+          </p:cNvSpPr>
+          <p:nvPr>
+            <p:extLst>
+              <p:ext uri="{386F3935-93C4-4BCD-93E2-E3B085C9AB24}">
+                <p16:designElem xmlns:p16="http://schemas.microsoft.com/office/powerpoint/2015/main" val="1"/>
+              </p:ext>
+            </p:extLst>
+          </p:nvPr>
+        </p:nvSpPr>
+        <p:spPr>
+          <a:xfrm rot="10800000">
+            <a:off x="-3059" y="0"/>
+            <a:ext cx="12191999" cy="3337560"/>
+          </a:xfrm>
+          <a:prstGeom prst="rect">
+            <a:avLst/>
+          </a:prstGeom>
+          <a:blipFill dpi="0" rotWithShape="1">
+            <a:blip r:embed="rId3">
+              <a:alphaModFix amt="20000"/>
+              <a:duotone>
+                <a:schemeClr val="accent1">
+                  <a:shade val="45000"/>
+                  <a:satMod val="135000"/>
+                </a:schemeClr>
+                <a:prstClr val="white"/>
+              </a:duotone>
+            </a:blip>
+            <a:srcRect/>
+            <a:tile tx="889000" ty="0" sx="100000" sy="100000" flip="none" algn="tl"/>
+          </a:blipFill>
+          <a:ln>
+            <a:noFill/>
+          </a:ln>
+        </p:spPr>
+        <p:style>
+          <a:lnRef idx="2">
+            <a:schemeClr val="accent1">
+              <a:shade val="50000"/>
+            </a:schemeClr>
+          </a:lnRef>
+          <a:fillRef idx="1">
+            <a:schemeClr val="accent1"/>
+          </a:fillRef>
+          <a:effectRef idx="0">
+            <a:schemeClr val="accent1"/>
+          </a:effectRef>
+          <a:fontRef idx="minor">
+            <a:schemeClr val="lt1"/>
+          </a:fontRef>
+        </p:style>
+        <p:txBody>
+          <a:bodyPr rtlCol="0" anchor="ctr"/>
+          <a:lstStyle/>
+          <a:p>
+            <a:pPr algn="ctr"/>
+            <a:endParaRPr lang="en-US" dirty="0"/>
+          </a:p>
+        </p:txBody>
+      </p:sp>
+      <p:sp>
+        <p:nvSpPr>
+          <p:cNvPr id="2" name="Title 1">
+            <a:extLst>
+              <a:ext uri="{FF2B5EF4-FFF2-40B4-BE49-F238E27FC236}">
+                <a16:creationId xmlns:a16="http://schemas.microsoft.com/office/drawing/2014/main" id="{5A299B43-7E9A-4478-8397-D7F3ED7381ED}"/>
+              </a:ext>
+            </a:extLst>
+          </p:cNvPr>
+          <p:cNvSpPr>
+            <a:spLocks noGrp="1"/>
+          </p:cNvSpPr>
+          <p:nvPr>
+            <p:ph type="title"/>
+          </p:nvPr>
+        </p:nvSpPr>
+        <p:spPr>
+          <a:xfrm>
+            <a:off x="838200" y="744909"/>
+            <a:ext cx="5029200" cy="2150691"/>
+          </a:xfrm>
+        </p:spPr>
+        <p:txBody>
+          <a:bodyPr vert="horz" lIns="91440" tIns="45720" rIns="91440" bIns="45720" rtlCol="0" anchor="b">
+            <a:normAutofit/>
+          </a:bodyPr>
+          <a:lstStyle/>
+          <a:p>
+            <a:r>
+              <a:rPr lang="en-US"/>
+              <a:t>Results - 3</a:t>
+            </a:r>
+          </a:p>
+        </p:txBody>
+      </p:sp>
+      <p:pic>
+        <p:nvPicPr>
+          <p:cNvPr id="4" name="Picture 4" descr="A screenshot of a cell phone&#10;&#10;Description automatically generated">
+            <a:extLst>
+              <a:ext uri="{FF2B5EF4-FFF2-40B4-BE49-F238E27FC236}">
+                <a16:creationId xmlns:a16="http://schemas.microsoft.com/office/drawing/2014/main" id="{1CC3098F-845F-4331-86C3-F14ABDE6B07D}"/>
+              </a:ext>
+            </a:extLst>
+          </p:cNvPr>
+          <p:cNvPicPr>
+            <a:picLocks noChangeAspect="1"/>
+          </p:cNvPicPr>
+          <p:nvPr/>
+        </p:nvPicPr>
+        <p:blipFill>
+          <a:blip r:embed="rId4"/>
+          <a:stretch>
+            <a:fillRect/>
+          </a:stretch>
+        </p:blipFill>
+        <p:spPr>
+          <a:xfrm>
+            <a:off x="4067495" y="4320406"/>
+            <a:ext cx="3503568" cy="2093381"/>
+          </a:xfrm>
+          <a:prstGeom prst="rect">
+            <a:avLst/>
+          </a:prstGeom>
+        </p:spPr>
+      </p:pic>
+      <p:pic>
+        <p:nvPicPr>
+          <p:cNvPr id="3" name="Picture 3" descr="A picture containing rock&#10;&#10;Description automatically generated">
+            <a:extLst>
+              <a:ext uri="{FF2B5EF4-FFF2-40B4-BE49-F238E27FC236}">
+                <a16:creationId xmlns:a16="http://schemas.microsoft.com/office/drawing/2014/main" id="{D2A85835-C253-4B4C-B076-362558186564}"/>
+              </a:ext>
+            </a:extLst>
+          </p:cNvPr>
+          <p:cNvPicPr>
+            <a:picLocks noChangeAspect="1"/>
+          </p:cNvPicPr>
+          <p:nvPr/>
+        </p:nvPicPr>
+        <p:blipFill>
+          <a:blip r:embed="rId5"/>
+          <a:stretch>
+            <a:fillRect/>
+          </a:stretch>
+        </p:blipFill>
+        <p:spPr>
+          <a:xfrm>
+            <a:off x="163092" y="4498112"/>
+            <a:ext cx="3676856" cy="1954626"/>
+          </a:xfrm>
+          <a:prstGeom prst="rect">
+            <a:avLst/>
+          </a:prstGeom>
+        </p:spPr>
+      </p:pic>
+      <p:pic>
+        <p:nvPicPr>
+          <p:cNvPr id="5" name="Picture 5" descr="A close up of a mountain&#10;&#10;Description automatically generated">
+            <a:extLst>
+              <a:ext uri="{FF2B5EF4-FFF2-40B4-BE49-F238E27FC236}">
+                <a16:creationId xmlns:a16="http://schemas.microsoft.com/office/drawing/2014/main" id="{8D43DAC5-3221-4C89-BEEF-26A58F0826C0}"/>
+              </a:ext>
+            </a:extLst>
+          </p:cNvPr>
+          <p:cNvPicPr>
+            <a:picLocks noChangeAspect="1"/>
+          </p:cNvPicPr>
+          <p:nvPr/>
+        </p:nvPicPr>
+        <p:blipFill>
+          <a:blip r:embed="rId6"/>
+          <a:stretch>
+            <a:fillRect/>
+          </a:stretch>
+        </p:blipFill>
+        <p:spPr>
+          <a:xfrm>
+            <a:off x="8034700" y="4281763"/>
+            <a:ext cx="3504484" cy="2132800"/>
+          </a:xfrm>
+          <a:prstGeom prst="rect">
+            <a:avLst/>
+          </a:prstGeom>
+        </p:spPr>
+      </p:pic>
+      <p:sp>
+        <p:nvSpPr>
+          <p:cNvPr id="8" name="TextBox 7">
+            <a:extLst>
+              <a:ext uri="{FF2B5EF4-FFF2-40B4-BE49-F238E27FC236}">
+                <a16:creationId xmlns:a16="http://schemas.microsoft.com/office/drawing/2014/main" id="{A97F157C-111E-430E-9BC0-44D5264CE33D}"/>
+              </a:ext>
+            </a:extLst>
+          </p:cNvPr>
+          <p:cNvSpPr txBox="1"/>
+          <p:nvPr/>
+        </p:nvSpPr>
+        <p:spPr>
+          <a:xfrm>
+            <a:off x="234212" y="6448284"/>
+            <a:ext cx="3605736" cy="319414"/>
+          </a:xfrm>
+          <a:prstGeom prst="rect">
+            <a:avLst/>
+          </a:prstGeom>
+          <a:solidFill>
+            <a:srgbClr val="000000">
+              <a:alpha val="50000"/>
+            </a:srgbClr>
+          </a:solidFill>
+          <a:ln>
+            <a:noFill/>
+          </a:ln>
+        </p:spPr>
+        <p:txBody>
+          <a:bodyPr rot="0" spcFirstLastPara="0" vertOverflow="overflow" horzOverflow="overflow" vert="horz" wrap="square" lIns="91440" tIns="45720" rIns="91440" bIns="45720" numCol="1" spcCol="0" rtlCol="0" fromWordArt="0" anchor="t" anchorCtr="0" forceAA="0" compatLnSpc="1">
+            <a:prstTxWarp prst="textNoShape">
+              <a:avLst/>
+            </a:prstTxWarp>
+            <a:noAutofit/>
+          </a:bodyPr>
+          <a:lstStyle/>
+          <a:p>
+            <a:pPr algn="ctr">
+              <a:spcAft>
+                <a:spcPts val="600"/>
+              </a:spcAft>
+            </a:pPr>
+            <a:r>
+              <a:rPr lang="en-US" sz="1200">
+                <a:solidFill>
+                  <a:srgbClr val="FFFFFF"/>
+                </a:solidFill>
+              </a:rPr>
+              <a:t>Input images</a:t>
+            </a:r>
+          </a:p>
+        </p:txBody>
+      </p:sp>
+      <p:sp>
+        <p:nvSpPr>
+          <p:cNvPr id="10" name="TextBox 9">
+            <a:extLst>
+              <a:ext uri="{FF2B5EF4-FFF2-40B4-BE49-F238E27FC236}">
+                <a16:creationId xmlns:a16="http://schemas.microsoft.com/office/drawing/2014/main" id="{53D88CA8-76E1-46B1-92C4-5D2FE13C6812}"/>
+              </a:ext>
+            </a:extLst>
+          </p:cNvPr>
+          <p:cNvSpPr txBox="1"/>
+          <p:nvPr/>
+        </p:nvSpPr>
+        <p:spPr>
+          <a:xfrm>
+            <a:off x="4067495" y="6448289"/>
+            <a:ext cx="3503568" cy="412538"/>
+          </a:xfrm>
+          <a:prstGeom prst="rect">
+            <a:avLst/>
+          </a:prstGeom>
+          <a:solidFill>
+            <a:srgbClr val="000000">
+              <a:alpha val="50000"/>
+            </a:srgbClr>
+          </a:solidFill>
+          <a:ln>
+            <a:noFill/>
+          </a:ln>
+        </p:spPr>
+        <p:txBody>
+          <a:bodyPr rot="0" spcFirstLastPara="0" vertOverflow="overflow" horzOverflow="overflow" vert="horz" wrap="square" lIns="91440" tIns="45720" rIns="91440" bIns="45720" numCol="1" spcCol="0" rtlCol="0" fromWordArt="0" anchor="t" anchorCtr="0" forceAA="0" compatLnSpc="1">
+            <a:prstTxWarp prst="textNoShape">
+              <a:avLst/>
+            </a:prstTxWarp>
+            <a:noAutofit/>
+          </a:bodyPr>
+          <a:lstStyle/>
+          <a:p>
+            <a:pPr algn="ctr">
+              <a:spcAft>
+                <a:spcPts val="600"/>
+              </a:spcAft>
+            </a:pPr>
+            <a:r>
+              <a:rPr lang="en-US" sz="1200">
+                <a:solidFill>
+                  <a:srgbClr val="FFFFFF"/>
+                </a:solidFill>
+              </a:rPr>
+              <a:t>Output image from patch match: nearest patch distances</a:t>
+            </a:r>
+          </a:p>
+        </p:txBody>
+      </p:sp>
+      <p:sp>
+        <p:nvSpPr>
+          <p:cNvPr id="12" name="TextBox 11">
+            <a:extLst>
+              <a:ext uri="{FF2B5EF4-FFF2-40B4-BE49-F238E27FC236}">
+                <a16:creationId xmlns:a16="http://schemas.microsoft.com/office/drawing/2014/main" id="{3870AEE0-7F1C-4BA9-A86F-E8EFC046DA43}"/>
+              </a:ext>
+            </a:extLst>
+          </p:cNvPr>
+          <p:cNvSpPr txBox="1"/>
+          <p:nvPr/>
+        </p:nvSpPr>
+        <p:spPr>
+          <a:xfrm>
+            <a:off x="8034700" y="6445123"/>
+            <a:ext cx="3504484" cy="213280"/>
+          </a:xfrm>
+          <a:prstGeom prst="rect">
+            <a:avLst/>
+          </a:prstGeom>
+          <a:solidFill>
+            <a:srgbClr val="000000">
+              <a:alpha val="50000"/>
+            </a:srgbClr>
+          </a:solidFill>
+          <a:ln>
+            <a:noFill/>
+          </a:ln>
+        </p:spPr>
+        <p:txBody>
+          <a:bodyPr rot="0" spcFirstLastPara="0" vertOverflow="overflow" horzOverflow="overflow" vert="horz" wrap="square" lIns="91440" tIns="45720" rIns="91440" bIns="45720" numCol="1" spcCol="0" rtlCol="0" fromWordArt="0" anchor="t" anchorCtr="0" forceAA="0" compatLnSpc="1">
+            <a:prstTxWarp prst="textNoShape">
+              <a:avLst/>
+            </a:prstTxWarp>
+            <a:noAutofit/>
+          </a:bodyPr>
+          <a:lstStyle/>
+          <a:p>
+            <a:pPr algn="ctr">
+              <a:spcAft>
+                <a:spcPts val="600"/>
+              </a:spcAft>
+            </a:pPr>
+            <a:r>
+              <a:rPr lang="en-US" sz="1200">
+                <a:solidFill>
+                  <a:srgbClr val="FFFFFF"/>
+                </a:solidFill>
+              </a:rPr>
+              <a:t>Reconstructed image</a:t>
+            </a:r>
+          </a:p>
+        </p:txBody>
+      </p:sp>
+    </p:spTree>
+    <p:extLst>
+      <p:ext uri="{BB962C8B-B14F-4D97-AF65-F5344CB8AC3E}">
+        <p14:creationId xmlns:p14="http://schemas.microsoft.com/office/powerpoint/2010/main" val="2628270037"/>
       </p:ext>
     </p:extLst>
   </p:cSld>

</xml_diff>